<commit_message>
catboost and slides update
</commit_message>
<xml_diff>
--- a/Customer Churn Prediction.pptx
+++ b/Customer Churn Prediction.pptx
@@ -818,7 +818,7 @@
   <p:cSld>
     <p:spTree>
       <p:nvGrpSpPr>
-        <p:cNvPr id="118" name="Shape 118"/>
+        <p:cNvPr id="127" name="Shape 127"/>
         <p:cNvGrpSpPr/>
         <p:nvPr/>
       </p:nvGrpSpPr>
@@ -832,7 +832,7 @@
       </p:grpSpPr>
       <p:sp>
         <p:nvSpPr>
-          <p:cNvPr id="119" name="Google Shape;119;g1ce40166a3c_0_122:notes"/>
+          <p:cNvPr id="128" name="Google Shape;128;g1ce40166a3c_0_122:notes"/>
           <p:cNvSpPr/>
           <p:nvPr>
             <p:ph idx="2" type="sldImg"/>
@@ -867,7 +867,7 @@
       </p:sp>
       <p:sp>
         <p:nvSpPr>
-          <p:cNvPr id="120" name="Google Shape;120;g1ce40166a3c_0_122:notes"/>
+          <p:cNvPr id="129" name="Google Shape;129;g1ce40166a3c_0_122:notes"/>
           <p:cNvSpPr txBox="1"/>
           <p:nvPr>
             <p:ph idx="1" type="body"/>
@@ -917,7 +917,7 @@
   <p:cSld>
     <p:spTree>
       <p:nvGrpSpPr>
-        <p:cNvPr id="125" name="Shape 125"/>
+        <p:cNvPr id="137" name="Shape 137"/>
         <p:cNvGrpSpPr/>
         <p:nvPr/>
       </p:nvGrpSpPr>
@@ -931,7 +931,7 @@
       </p:grpSpPr>
       <p:sp>
         <p:nvSpPr>
-          <p:cNvPr id="126" name="Google Shape;126;g1ce40166a3c_0_131:notes"/>
+          <p:cNvPr id="138" name="Google Shape;138;g1ce40166a3c_0_131:notes"/>
           <p:cNvSpPr/>
           <p:nvPr>
             <p:ph idx="2" type="sldImg"/>
@@ -966,7 +966,7 @@
       </p:sp>
       <p:sp>
         <p:nvSpPr>
-          <p:cNvPr id="127" name="Google Shape;127;g1ce40166a3c_0_131:notes"/>
+          <p:cNvPr id="139" name="Google Shape;139;g1ce40166a3c_0_131:notes"/>
           <p:cNvSpPr txBox="1"/>
           <p:nvPr>
             <p:ph idx="1" type="body"/>
@@ -1016,7 +1016,7 @@
   <p:cSld>
     <p:spTree>
       <p:nvGrpSpPr>
-        <p:cNvPr id="131" name="Shape 131"/>
+        <p:cNvPr id="144" name="Shape 144"/>
         <p:cNvGrpSpPr/>
         <p:nvPr/>
       </p:nvGrpSpPr>
@@ -1030,7 +1030,7 @@
       </p:grpSpPr>
       <p:sp>
         <p:nvSpPr>
-          <p:cNvPr id="132" name="Google Shape;132;g1ce40166a3c_0_137:notes"/>
+          <p:cNvPr id="145" name="Google Shape;145;g1ce40166a3c_0_137:notes"/>
           <p:cNvSpPr/>
           <p:nvPr>
             <p:ph idx="2" type="sldImg"/>
@@ -1065,7 +1065,7 @@
       </p:sp>
       <p:sp>
         <p:nvSpPr>
-          <p:cNvPr id="133" name="Google Shape;133;g1ce40166a3c_0_137:notes"/>
+          <p:cNvPr id="146" name="Google Shape;146;g1ce40166a3c_0_137:notes"/>
           <p:cNvSpPr txBox="1"/>
           <p:nvPr>
             <p:ph idx="1" type="body"/>
@@ -1115,7 +1115,7 @@
   <p:cSld>
     <p:spTree>
       <p:nvGrpSpPr>
-        <p:cNvPr id="137" name="Shape 137"/>
+        <p:cNvPr id="151" name="Shape 151"/>
         <p:cNvGrpSpPr/>
         <p:nvPr/>
       </p:nvGrpSpPr>
@@ -1129,7 +1129,7 @@
       </p:grpSpPr>
       <p:sp>
         <p:nvSpPr>
-          <p:cNvPr id="138" name="Google Shape;138;g1ce40166a3c_0_146:notes"/>
+          <p:cNvPr id="152" name="Google Shape;152;g1ce40166a3c_0_146:notes"/>
           <p:cNvSpPr/>
           <p:nvPr>
             <p:ph idx="2" type="sldImg"/>
@@ -1164,7 +1164,7 @@
       </p:sp>
       <p:sp>
         <p:nvSpPr>
-          <p:cNvPr id="139" name="Google Shape;139;g1ce40166a3c_0_146:notes"/>
+          <p:cNvPr id="153" name="Google Shape;153;g1ce40166a3c_0_146:notes"/>
           <p:cNvSpPr txBox="1"/>
           <p:nvPr>
             <p:ph idx="1" type="body"/>
@@ -1214,7 +1214,7 @@
   <p:cSld>
     <p:spTree>
       <p:nvGrpSpPr>
-        <p:cNvPr id="144" name="Shape 144"/>
+        <p:cNvPr id="159" name="Shape 159"/>
         <p:cNvGrpSpPr/>
         <p:nvPr/>
       </p:nvGrpSpPr>
@@ -1228,7 +1228,7 @@
       </p:grpSpPr>
       <p:sp>
         <p:nvSpPr>
-          <p:cNvPr id="145" name="Google Shape;145;g1ce40166a3c_0_155:notes"/>
+          <p:cNvPr id="160" name="Google Shape;160;g1ce40166a3c_0_155:notes"/>
           <p:cNvSpPr/>
           <p:nvPr>
             <p:ph idx="2" type="sldImg"/>
@@ -1263,7 +1263,7 @@
       </p:sp>
       <p:sp>
         <p:nvSpPr>
-          <p:cNvPr id="146" name="Google Shape;146;g1ce40166a3c_0_155:notes"/>
+          <p:cNvPr id="161" name="Google Shape;161;g1ce40166a3c_0_155:notes"/>
           <p:cNvSpPr txBox="1"/>
           <p:nvPr>
             <p:ph idx="1" type="body"/>
@@ -1313,7 +1313,7 @@
   <p:cSld>
     <p:spTree>
       <p:nvGrpSpPr>
-        <p:cNvPr id="150" name="Shape 150"/>
+        <p:cNvPr id="166" name="Shape 166"/>
         <p:cNvGrpSpPr/>
         <p:nvPr/>
       </p:nvGrpSpPr>
@@ -1327,7 +1327,7 @@
       </p:grpSpPr>
       <p:sp>
         <p:nvSpPr>
-          <p:cNvPr id="151" name="Google Shape;151;g1ce40166a3c_0_160:notes"/>
+          <p:cNvPr id="167" name="Google Shape;167;g1ce40166a3c_0_160:notes"/>
           <p:cNvSpPr/>
           <p:nvPr>
             <p:ph idx="2" type="sldImg"/>
@@ -1362,7 +1362,7 @@
       </p:sp>
       <p:sp>
         <p:nvSpPr>
-          <p:cNvPr id="152" name="Google Shape;152;g1ce40166a3c_0_160:notes"/>
+          <p:cNvPr id="168" name="Google Shape;168;g1ce40166a3c_0_160:notes"/>
           <p:cNvSpPr txBox="1"/>
           <p:nvPr>
             <p:ph idx="1" type="body"/>
@@ -1412,7 +1412,7 @@
   <p:cSld>
     <p:spTree>
       <p:nvGrpSpPr>
-        <p:cNvPr id="157" name="Shape 157"/>
+        <p:cNvPr id="175" name="Shape 175"/>
         <p:cNvGrpSpPr/>
         <p:nvPr/>
       </p:nvGrpSpPr>
@@ -1426,7 +1426,7 @@
       </p:grpSpPr>
       <p:sp>
         <p:nvSpPr>
-          <p:cNvPr id="158" name="Google Shape;158;g1ce40166a3c_0_167:notes"/>
+          <p:cNvPr id="176" name="Google Shape;176;g1ce40166a3c_0_167:notes"/>
           <p:cNvSpPr/>
           <p:nvPr>
             <p:ph idx="2" type="sldImg"/>
@@ -1461,7 +1461,7 @@
       </p:sp>
       <p:sp>
         <p:nvSpPr>
-          <p:cNvPr id="159" name="Google Shape;159;g1ce40166a3c_0_167:notes"/>
+          <p:cNvPr id="177" name="Google Shape;177;g1ce40166a3c_0_167:notes"/>
           <p:cNvSpPr txBox="1"/>
           <p:nvPr>
             <p:ph idx="1" type="body"/>
@@ -1511,7 +1511,7 @@
   <p:cSld>
     <p:spTree>
       <p:nvGrpSpPr>
-        <p:cNvPr id="163" name="Shape 163"/>
+        <p:cNvPr id="181" name="Shape 181"/>
         <p:cNvGrpSpPr/>
         <p:nvPr/>
       </p:nvGrpSpPr>
@@ -1525,7 +1525,7 @@
       </p:grpSpPr>
       <p:sp>
         <p:nvSpPr>
-          <p:cNvPr id="164" name="Google Shape;164;g1ce40166a3c_0_174:notes"/>
+          <p:cNvPr id="182" name="Google Shape;182;g1ce40166a3c_0_174:notes"/>
           <p:cNvSpPr/>
           <p:nvPr>
             <p:ph idx="2" type="sldImg"/>
@@ -1560,7 +1560,7 @@
       </p:sp>
       <p:sp>
         <p:nvSpPr>
-          <p:cNvPr id="165" name="Google Shape;165;g1ce40166a3c_0_174:notes"/>
+          <p:cNvPr id="183" name="Google Shape;183;g1ce40166a3c_0_174:notes"/>
           <p:cNvSpPr txBox="1"/>
           <p:nvPr>
             <p:ph idx="1" type="body"/>
@@ -1610,7 +1610,7 @@
   <p:cSld>
     <p:spTree>
       <p:nvGrpSpPr>
-        <p:cNvPr id="170" name="Shape 170"/>
+        <p:cNvPr id="188" name="Shape 188"/>
         <p:cNvGrpSpPr/>
         <p:nvPr/>
       </p:nvGrpSpPr>
@@ -1624,7 +1624,7 @@
       </p:grpSpPr>
       <p:sp>
         <p:nvSpPr>
-          <p:cNvPr id="171" name="Google Shape;171;g1ce40166a3c_0_179:notes"/>
+          <p:cNvPr id="189" name="Google Shape;189;g1ce40166a3c_0_179:notes"/>
           <p:cNvSpPr/>
           <p:nvPr>
             <p:ph idx="2" type="sldImg"/>
@@ -1659,7 +1659,7 @@
       </p:sp>
       <p:sp>
         <p:nvSpPr>
-          <p:cNvPr id="172" name="Google Shape;172;g1ce40166a3c_0_179:notes"/>
+          <p:cNvPr id="190" name="Google Shape;190;g1ce40166a3c_0_179:notes"/>
           <p:cNvSpPr txBox="1"/>
           <p:nvPr>
             <p:ph idx="1" type="body"/>
@@ -1709,7 +1709,7 @@
   <p:cSld>
     <p:spTree>
       <p:nvGrpSpPr>
-        <p:cNvPr id="176" name="Shape 176"/>
+        <p:cNvPr id="194" name="Shape 194"/>
         <p:cNvGrpSpPr/>
         <p:nvPr/>
       </p:nvGrpSpPr>
@@ -1723,7 +1723,7 @@
       </p:grpSpPr>
       <p:sp>
         <p:nvSpPr>
-          <p:cNvPr id="177" name="Google Shape;177;g1ce40166a3c_0_185:notes"/>
+          <p:cNvPr id="195" name="Google Shape;195;g1ce40166a3c_0_185:notes"/>
           <p:cNvSpPr/>
           <p:nvPr>
             <p:ph idx="2" type="sldImg"/>
@@ -1758,7 +1758,7 @@
       </p:sp>
       <p:sp>
         <p:nvSpPr>
-          <p:cNvPr id="178" name="Google Shape;178;g1ce40166a3c_0_185:notes"/>
+          <p:cNvPr id="196" name="Google Shape;196;g1ce40166a3c_0_185:notes"/>
           <p:cNvSpPr txBox="1"/>
           <p:nvPr>
             <p:ph idx="1" type="body"/>
@@ -1907,7 +1907,7 @@
   <p:cSld>
     <p:spTree>
       <p:nvGrpSpPr>
-        <p:cNvPr id="182" name="Shape 182"/>
+        <p:cNvPr id="200" name="Shape 200"/>
         <p:cNvGrpSpPr/>
         <p:nvPr/>
       </p:nvGrpSpPr>
@@ -1921,7 +1921,7 @@
       </p:grpSpPr>
       <p:sp>
         <p:nvSpPr>
-          <p:cNvPr id="183" name="Google Shape;183;g1ce40166a3c_0_190:notes"/>
+          <p:cNvPr id="201" name="Google Shape;201;g1ce40166a3c_0_190:notes"/>
           <p:cNvSpPr/>
           <p:nvPr>
             <p:ph idx="2" type="sldImg"/>
@@ -1956,7 +1956,7 @@
       </p:sp>
       <p:sp>
         <p:nvSpPr>
-          <p:cNvPr id="184" name="Google Shape;184;g1ce40166a3c_0_190:notes"/>
+          <p:cNvPr id="202" name="Google Shape;202;g1ce40166a3c_0_190:notes"/>
           <p:cNvSpPr txBox="1"/>
           <p:nvPr>
             <p:ph idx="1" type="body"/>
@@ -2204,7 +2204,7 @@
   <p:cSld>
     <p:spTree>
       <p:nvGrpSpPr>
-        <p:cNvPr id="87" name="Shape 87"/>
+        <p:cNvPr id="88" name="Shape 88"/>
         <p:cNvGrpSpPr/>
         <p:nvPr/>
       </p:nvGrpSpPr>
@@ -2218,7 +2218,7 @@
       </p:grpSpPr>
       <p:sp>
         <p:nvSpPr>
-          <p:cNvPr id="88" name="Google Shape;88;g1ce40166a3c_0_83:notes"/>
+          <p:cNvPr id="89" name="Google Shape;89;g1ce40166a3c_0_83:notes"/>
           <p:cNvSpPr/>
           <p:nvPr>
             <p:ph idx="2" type="sldImg"/>
@@ -2253,7 +2253,7 @@
       </p:sp>
       <p:sp>
         <p:nvSpPr>
-          <p:cNvPr id="89" name="Google Shape;89;g1ce40166a3c_0_83:notes"/>
+          <p:cNvPr id="90" name="Google Shape;90;g1ce40166a3c_0_83:notes"/>
           <p:cNvSpPr txBox="1"/>
           <p:nvPr>
             <p:ph idx="1" type="body"/>
@@ -2303,7 +2303,7 @@
   <p:cSld>
     <p:spTree>
       <p:nvGrpSpPr>
-        <p:cNvPr id="93" name="Shape 93"/>
+        <p:cNvPr id="95" name="Shape 95"/>
         <p:cNvGrpSpPr/>
         <p:nvPr/>
       </p:nvGrpSpPr>
@@ -2317,7 +2317,7 @@
       </p:grpSpPr>
       <p:sp>
         <p:nvSpPr>
-          <p:cNvPr id="94" name="Google Shape;94;g1ce40166a3c_0_89:notes"/>
+          <p:cNvPr id="96" name="Google Shape;96;g1ce40166a3c_0_89:notes"/>
           <p:cNvSpPr/>
           <p:nvPr>
             <p:ph idx="2" type="sldImg"/>
@@ -2352,7 +2352,7 @@
       </p:sp>
       <p:sp>
         <p:nvSpPr>
-          <p:cNvPr id="95" name="Google Shape;95;g1ce40166a3c_0_89:notes"/>
+          <p:cNvPr id="97" name="Google Shape;97;g1ce40166a3c_0_89:notes"/>
           <p:cNvSpPr txBox="1"/>
           <p:nvPr>
             <p:ph idx="1" type="body"/>
@@ -2402,7 +2402,7 @@
   <p:cSld>
     <p:spTree>
       <p:nvGrpSpPr>
-        <p:cNvPr id="99" name="Shape 99"/>
+        <p:cNvPr id="103" name="Shape 103"/>
         <p:cNvGrpSpPr/>
         <p:nvPr/>
       </p:nvGrpSpPr>
@@ -2416,7 +2416,7 @@
       </p:grpSpPr>
       <p:sp>
         <p:nvSpPr>
-          <p:cNvPr id="100" name="Google Shape;100;g1ce40166a3c_0_102:notes"/>
+          <p:cNvPr id="104" name="Google Shape;104;g1ce40166a3c_0_102:notes"/>
           <p:cNvSpPr/>
           <p:nvPr>
             <p:ph idx="2" type="sldImg"/>
@@ -2451,7 +2451,7 @@
       </p:sp>
       <p:sp>
         <p:nvSpPr>
-          <p:cNvPr id="101" name="Google Shape;101;g1ce40166a3c_0_102:notes"/>
+          <p:cNvPr id="105" name="Google Shape;105;g1ce40166a3c_0_102:notes"/>
           <p:cNvSpPr txBox="1"/>
           <p:nvPr>
             <p:ph idx="1" type="body"/>
@@ -2501,7 +2501,7 @@
   <p:cSld>
     <p:spTree>
       <p:nvGrpSpPr>
-        <p:cNvPr id="106" name="Shape 106"/>
+        <p:cNvPr id="111" name="Shape 111"/>
         <p:cNvGrpSpPr/>
         <p:nvPr/>
       </p:nvGrpSpPr>
@@ -2515,7 +2515,7 @@
       </p:grpSpPr>
       <p:sp>
         <p:nvSpPr>
-          <p:cNvPr id="107" name="Google Shape;107;g1ce40166a3c_0_110:notes"/>
+          <p:cNvPr id="112" name="Google Shape;112;g1ce40166a3c_0_110:notes"/>
           <p:cNvSpPr/>
           <p:nvPr>
             <p:ph idx="2" type="sldImg"/>
@@ -2550,7 +2550,7 @@
       </p:sp>
       <p:sp>
         <p:nvSpPr>
-          <p:cNvPr id="108" name="Google Shape;108;g1ce40166a3c_0_110:notes"/>
+          <p:cNvPr id="113" name="Google Shape;113;g1ce40166a3c_0_110:notes"/>
           <p:cNvSpPr txBox="1"/>
           <p:nvPr>
             <p:ph idx="1" type="body"/>
@@ -2600,7 +2600,7 @@
   <p:cSld>
     <p:spTree>
       <p:nvGrpSpPr>
-        <p:cNvPr id="112" name="Shape 112"/>
+        <p:cNvPr id="119" name="Shape 119"/>
         <p:cNvGrpSpPr/>
         <p:nvPr/>
       </p:nvGrpSpPr>
@@ -2614,7 +2614,7 @@
       </p:grpSpPr>
       <p:sp>
         <p:nvSpPr>
-          <p:cNvPr id="113" name="Google Shape;113;g1ce40166a3c_0_117:notes"/>
+          <p:cNvPr id="120" name="Google Shape;120;g1d228bc0aa7_0_11:notes"/>
           <p:cNvSpPr/>
           <p:nvPr>
             <p:ph idx="2" type="sldImg"/>
@@ -2649,7 +2649,7 @@
       </p:sp>
       <p:sp>
         <p:nvSpPr>
-          <p:cNvPr id="114" name="Google Shape;114;g1ce40166a3c_0_117:notes"/>
+          <p:cNvPr id="121" name="Google Shape;121;g1d228bc0aa7_0_11:notes"/>
           <p:cNvSpPr txBox="1"/>
           <p:nvPr>
             <p:ph idx="1" type="body"/>
@@ -8706,7 +8706,7 @@
   <p:cSld>
     <p:spTree>
       <p:nvGrpSpPr>
-        <p:cNvPr id="121" name="Shape 121"/>
+        <p:cNvPr id="130" name="Shape 130"/>
         <p:cNvGrpSpPr/>
         <p:nvPr/>
       </p:nvGrpSpPr>
@@ -8720,7 +8720,7 @@
       </p:grpSpPr>
       <p:sp>
         <p:nvSpPr>
-          <p:cNvPr id="122" name="Google Shape;122;p22"/>
+          <p:cNvPr id="131" name="Google Shape;131;p22"/>
           <p:cNvSpPr txBox="1"/>
           <p:nvPr>
             <p:ph type="title"/>
@@ -8758,84 +8758,9 @@
           </a:p>
         </p:txBody>
       </p:sp>
-      <p:sp>
-        <p:nvSpPr>
-          <p:cNvPr id="123" name="Google Shape;123;p22"/>
-          <p:cNvSpPr txBox="1"/>
-          <p:nvPr>
-            <p:ph idx="1" type="body"/>
-          </p:nvPr>
-        </p:nvSpPr>
-        <p:spPr>
-          <a:xfrm>
-            <a:off x="471900" y="1919075"/>
-            <a:ext cx="8222100" cy="2710200"/>
-          </a:xfrm>
-          <a:prstGeom prst="rect">
-            <a:avLst/>
-          </a:prstGeom>
-        </p:spPr>
-        <p:txBody>
-          <a:bodyPr anchorCtr="0" anchor="t" bIns="91425" lIns="91425" spcFirstLastPara="1" rIns="91425" wrap="square" tIns="91425">
-            <a:normAutofit/>
-          </a:bodyPr>
-          <a:lstStyle/>
-          <a:p>
-            <a:pPr indent="0" lvl="0" marL="0" rtl="0" algn="l">
-              <a:spcBef>
-                <a:spcPts val="0"/>
-              </a:spcBef>
-              <a:spcAft>
-                <a:spcPts val="0"/>
-              </a:spcAft>
-              <a:buNone/>
-            </a:pPr>
-            <a:r>
-              <a:rPr lang="en-GB" sz="1600">
-                <a:solidFill>
-                  <a:srgbClr val="000000"/>
-                </a:solidFill>
-              </a:rPr>
-              <a:t>The evaluate method is used to calculate the loss and accuracy metrics of the model using the test data. The loss is a measure of how well the model is able to predict the target variable. In this case, the loss function used is binary cross-entropy, The accuracy metric is a measure of how many of the predictions made by the model are correct.</a:t>
-            </a:r>
-            <a:endParaRPr sz="1600">
-              <a:solidFill>
-                <a:srgbClr val="000000"/>
-              </a:solidFill>
-            </a:endParaRPr>
-          </a:p>
-          <a:p>
-            <a:pPr indent="0" lvl="0" marL="0" rtl="0" algn="l">
-              <a:spcBef>
-                <a:spcPts val="1200"/>
-              </a:spcBef>
-              <a:spcAft>
-                <a:spcPts val="1200"/>
-              </a:spcAft>
-              <a:buNone/>
-            </a:pPr>
-            <a:r>
-              <a:rPr lang="en-GB" sz="1600">
-                <a:solidFill>
-                  <a:srgbClr val="000000"/>
-                </a:solidFill>
-              </a:rPr>
-              <a:t>The results of evaluating the model on the test data indicate that the model has an accuracy of 85.2%. This means that the model is able to correctly predict the outcome of the target variable (employee attrition) for 85.2% of the observations in the test set.</a:t>
-            </a:r>
-            <a:endParaRPr sz="1600">
-              <a:solidFill>
-                <a:srgbClr val="D1D5DB"/>
-              </a:solidFill>
-              <a:highlight>
-                <a:srgbClr val="444654"/>
-              </a:highlight>
-            </a:endParaRPr>
-          </a:p>
-        </p:txBody>
-      </p:sp>
       <p:pic>
         <p:nvPicPr>
-          <p:cNvPr id="124" name="Google Shape;124;p22"/>
+          <p:cNvPr id="132" name="Google Shape;132;p22"/>
           <p:cNvPicPr preferRelativeResize="0"/>
           <p:nvPr/>
         </p:nvPicPr>
@@ -8849,8 +8774,8 @@
         </p:blipFill>
         <p:spPr>
           <a:xfrm>
-            <a:off x="419750" y="4398175"/>
-            <a:ext cx="8222100" cy="607525"/>
+            <a:off x="3743575" y="1995025"/>
+            <a:ext cx="5067300" cy="2400300"/>
           </a:xfrm>
           <a:prstGeom prst="rect">
             <a:avLst/>
@@ -8861,51 +8786,28 @@
           </a:ln>
         </p:spPr>
       </p:pic>
-    </p:spTree>
-  </p:cSld>
-  <p:clrMapOvr>
-    <a:masterClrMapping/>
-  </p:clrMapOvr>
-</p:sld>
-</file>
-
-<file path=ppt/slides/slide11.xml><?xml version="1.0" encoding="utf-8"?>
-<p:sld xmlns:a="http://schemas.openxmlformats.org/drawingml/2006/main" xmlns:r="http://schemas.openxmlformats.org/officeDocument/2006/relationships" xmlns:mc="http://schemas.openxmlformats.org/markup-compatibility/2006" xmlns:mv="urn:schemas-microsoft-com:mac:vml" xmlns:p="http://schemas.openxmlformats.org/presentationml/2006/main" xmlns:c="http://schemas.openxmlformats.org/drawingml/2006/chart" xmlns:dgm="http://schemas.openxmlformats.org/drawingml/2006/diagram" xmlns:o="urn:schemas-microsoft-com:office:office" xmlns:v="urn:schemas-microsoft-com:vml" xmlns:pvml="urn:schemas-microsoft-com:office:powerpoint" xmlns:com="http://schemas.openxmlformats.org/drawingml/2006/compatibility" xmlns:p14="http://schemas.microsoft.com/office/powerpoint/2010/main" xmlns:p15="http://schemas.microsoft.com/office/powerpoint/2012/main" xmlns:ahyp="http://schemas.microsoft.com/office/drawing/2018/hyperlinkcolor">
-  <p:cSld>
-    <p:spTree>
-      <p:nvGrpSpPr>
-        <p:cNvPr id="128" name="Shape 128"/>
-        <p:cNvGrpSpPr/>
-        <p:nvPr/>
-      </p:nvGrpSpPr>
-      <p:grpSpPr>
-        <a:xfrm>
-          <a:off x="0" y="0"/>
-          <a:ext cx="0" cy="0"/>
-          <a:chOff x="0" y="0"/>
-          <a:chExt cx="0" cy="0"/>
-        </a:xfrm>
-      </p:grpSpPr>
       <p:sp>
         <p:nvSpPr>
-          <p:cNvPr id="129" name="Google Shape;129;p23"/>
+          <p:cNvPr id="133" name="Google Shape;133;p22"/>
           <p:cNvSpPr txBox="1"/>
-          <p:nvPr>
-            <p:ph type="title"/>
-          </p:nvPr>
+          <p:nvPr/>
         </p:nvSpPr>
         <p:spPr>
           <a:xfrm>
-            <a:off x="471900" y="738725"/>
-            <a:ext cx="8222100" cy="767700"/>
+            <a:off x="3369375" y="3541075"/>
+            <a:ext cx="507900" cy="400200"/>
           </a:xfrm>
           <a:prstGeom prst="rect">
             <a:avLst/>
           </a:prstGeom>
+          <a:noFill/>
+          <a:ln>
+            <a:noFill/>
+          </a:ln>
         </p:spPr>
         <p:txBody>
-          <a:bodyPr anchorCtr="0" anchor="b" bIns="91425" lIns="91425" spcFirstLastPara="1" rIns="91425" wrap="square" tIns="91425">
-            <a:normAutofit fontScale="90000"/>
+          <a:bodyPr anchorCtr="0" anchor="t" bIns="91425" lIns="91425" spcFirstLastPara="1" rIns="91425" wrap="square" tIns="91425">
+            <a:spAutoFit/>
           </a:bodyPr>
           <a:lstStyle/>
           <a:p>
@@ -8919,16 +8821,67 @@
               <a:buNone/>
             </a:pPr>
             <a:r>
-              <a:rPr lang="en-GB"/>
-              <a:t>Logistic Regression Model using training data</a:t>
-            </a:r>
-            <a:endParaRPr/>
+              <a:t/>
+            </a:r>
+            <a:endParaRPr>
+              <a:latin typeface="Roboto"/>
+              <a:ea typeface="Roboto"/>
+              <a:cs typeface="Roboto"/>
+              <a:sym typeface="Roboto"/>
+            </a:endParaRPr>
           </a:p>
         </p:txBody>
       </p:sp>
       <p:sp>
         <p:nvSpPr>
-          <p:cNvPr id="130" name="Google Shape;130;p23"/>
+          <p:cNvPr id="134" name="Google Shape;134;p22"/>
+          <p:cNvSpPr/>
+          <p:nvPr/>
+        </p:nvSpPr>
+        <p:spPr>
+          <a:xfrm>
+            <a:off x="5723975" y="3541075"/>
+            <a:ext cx="435300" cy="166500"/>
+          </a:xfrm>
+          <a:prstGeom prst="rect">
+            <a:avLst/>
+          </a:prstGeom>
+          <a:noFill/>
+          <a:ln cap="flat" cmpd="sng" w="19050">
+            <a:solidFill>
+              <a:schemeClr val="accent3"/>
+            </a:solidFill>
+            <a:prstDash val="solid"/>
+            <a:round/>
+            <a:headEnd len="sm" w="sm" type="none"/>
+            <a:tailEnd len="sm" w="sm" type="none"/>
+          </a:ln>
+        </p:spPr>
+        <p:txBody>
+          <a:bodyPr anchorCtr="0" anchor="ctr" bIns="91425" lIns="91425" spcFirstLastPara="1" rIns="91425" wrap="square" tIns="91425">
+            <a:noAutofit/>
+          </a:bodyPr>
+          <a:lstStyle/>
+          <a:p>
+            <a:pPr indent="0" lvl="0" marL="0" rtl="0" algn="l">
+              <a:spcBef>
+                <a:spcPts val="0"/>
+              </a:spcBef>
+              <a:spcAft>
+                <a:spcPts val="0"/>
+              </a:spcAft>
+              <a:buNone/>
+            </a:pPr>
+            <a:r>
+              <a:t/>
+            </a:r>
+            <a:endParaRPr/>
+          </a:p>
+        </p:txBody>
+      </p:sp>
+      <p:sp>
+        <p:nvSpPr>
+          <p:cNvPr id="135" name="Google Shape;135;p22"/>
           <p:cNvSpPr txBox="1"/>
           <p:nvPr>
             <p:ph idx="1" type="body"/>
@@ -8937,7 +8890,7 @@
         <p:spPr>
           <a:xfrm>
             <a:off x="471900" y="1919075"/>
-            <a:ext cx="8222100" cy="2710200"/>
+            <a:ext cx="2897400" cy="2688000"/>
           </a:xfrm>
           <a:prstGeom prst="rect">
             <a:avLst/>
@@ -8949,26 +8902,26 @@
           </a:bodyPr>
           <a:lstStyle/>
           <a:p>
-            <a:pPr indent="-330200" lvl="0" marL="457200" rtl="0" algn="l">
-              <a:spcBef>
-                <a:spcPts val="0"/>
-              </a:spcBef>
-              <a:spcAft>
-                <a:spcPts val="0"/>
-              </a:spcAft>
-              <a:buClr>
-                <a:srgbClr val="000000"/>
-              </a:buClr>
-              <a:buSzPts val="1600"/>
-              <a:buChar char="●"/>
-            </a:pPr>
-            <a:r>
-              <a:rPr lang="en-GB" sz="1600">
+            <a:pPr indent="0" lvl="0" marL="0" rtl="0" algn="l">
+              <a:spcBef>
+                <a:spcPts val="0"/>
+              </a:spcBef>
+              <a:spcAft>
+                <a:spcPts val="0"/>
+              </a:spcAft>
+              <a:buNone/>
+            </a:pPr>
+            <a:r>
+              <a:rPr lang="en-GB" sz="1200">
                 <a:solidFill>
                   <a:srgbClr val="000000"/>
                 </a:solidFill>
+                <a:latin typeface="Arial"/>
+                <a:ea typeface="Arial"/>
+                <a:cs typeface="Arial"/>
+                <a:sym typeface="Arial"/>
               </a:rPr>
-              <a:t>We imported the LogisticRegression module from the sklearn library and instantiated a Logistic Regression model using the LogisticRegression class. We set the solver parameter to 'lbfgs' and the random_state parameter to 1. We then fit the model to the training data using the fit method of the LogisticRegression class, passing in the training data and the target variable. </a:t>
+              <a:t>This problem is a typical classification task, the use of recall (i.e. ratio of true positive prediction made out of total positive cases in the dataset) as performance metrics are more relevant in this case, since correctly classifying elements of the positive class (customers who will churn) is more critical for the bank.</a:t>
             </a:r>
             <a:endParaRPr sz="1600">
               <a:solidFill>
@@ -8977,32 +8930,73 @@
             </a:endParaRPr>
           </a:p>
           <a:p>
-            <a:pPr indent="-355600" lvl="0" marL="457200" rtl="0" algn="l">
-              <a:spcBef>
-                <a:spcPts val="0"/>
-              </a:spcBef>
-              <a:spcAft>
-                <a:spcPts val="0"/>
-              </a:spcAft>
-              <a:buClr>
-                <a:srgbClr val="000000"/>
-              </a:buClr>
-              <a:buSzPts val="2000"/>
-              <a:buChar char="●"/>
-            </a:pPr>
-            <a:r>
-              <a:rPr lang="en-GB" sz="1600">
-                <a:solidFill>
-                  <a:srgbClr val="000000"/>
-                </a:solidFill>
-              </a:rPr>
-              <a:t>Finally, we used the testing data to make predictions using the predict method and stored the predictions in a variable called "predictions".</a:t>
-            </a:r>
-            <a:endParaRPr sz="2000">
+            <a:pPr indent="0" lvl="0" marL="457200" rtl="0" algn="l">
+              <a:spcBef>
+                <a:spcPts val="0"/>
+              </a:spcBef>
+              <a:spcAft>
+                <a:spcPts val="0"/>
+              </a:spcAft>
+              <a:buNone/>
+            </a:pPr>
+            <a:r>
+              <a:t/>
+            </a:r>
+            <a:endParaRPr sz="1200">
               <a:solidFill>
                 <a:srgbClr val="000000"/>
               </a:solidFill>
             </a:endParaRPr>
+          </a:p>
+        </p:txBody>
+      </p:sp>
+      <p:sp>
+        <p:nvSpPr>
+          <p:cNvPr id="136" name="Google Shape;136;p22"/>
+          <p:cNvSpPr txBox="1"/>
+          <p:nvPr/>
+        </p:nvSpPr>
+        <p:spPr>
+          <a:xfrm>
+            <a:off x="7332525" y="121625"/>
+            <a:ext cx="1511100" cy="384900"/>
+          </a:xfrm>
+          <a:prstGeom prst="rect">
+            <a:avLst/>
+          </a:prstGeom>
+          <a:noFill/>
+          <a:ln>
+            <a:noFill/>
+          </a:ln>
+        </p:spPr>
+        <p:txBody>
+          <a:bodyPr anchorCtr="0" anchor="t" bIns="91425" lIns="91425" spcFirstLastPara="1" rIns="91425" wrap="square" tIns="91425">
+            <a:spAutoFit/>
+          </a:bodyPr>
+          <a:lstStyle/>
+          <a:p>
+            <a:pPr indent="0" lvl="0" marL="0" rtl="0" algn="l">
+              <a:spcBef>
+                <a:spcPts val="0"/>
+              </a:spcBef>
+              <a:spcAft>
+                <a:spcPts val="0"/>
+              </a:spcAft>
+              <a:buNone/>
+            </a:pPr>
+            <a:r>
+              <a:rPr b="1" lang="en-GB" sz="1300" u="sng">
+                <a:solidFill>
+                  <a:schemeClr val="lt1"/>
+                </a:solidFill>
+                <a:latin typeface="Roboto"/>
+                <a:ea typeface="Roboto"/>
+                <a:cs typeface="Roboto"/>
+                <a:sym typeface="Roboto"/>
+              </a:rPr>
+              <a:t>Neural Network</a:t>
+            </a:r>
+            <a:endParaRPr b="1" sz="1300" u="sng"/>
           </a:p>
         </p:txBody>
       </p:sp>
@@ -9014,219 +9008,7 @@
 </p:sld>
 </file>
 
-<file path=ppt/slides/slide12.xml><?xml version="1.0" encoding="utf-8"?>
-<p:sld xmlns:a="http://schemas.openxmlformats.org/drawingml/2006/main" xmlns:r="http://schemas.openxmlformats.org/officeDocument/2006/relationships" xmlns:mc="http://schemas.openxmlformats.org/markup-compatibility/2006" xmlns:mv="urn:schemas-microsoft-com:mac:vml" xmlns:p="http://schemas.openxmlformats.org/presentationml/2006/main" xmlns:c="http://schemas.openxmlformats.org/drawingml/2006/chart" xmlns:dgm="http://schemas.openxmlformats.org/drawingml/2006/diagram" xmlns:o="urn:schemas-microsoft-com:office:office" xmlns:v="urn:schemas-microsoft-com:vml" xmlns:pvml="urn:schemas-microsoft-com:office:powerpoint" xmlns:com="http://schemas.openxmlformats.org/drawingml/2006/compatibility" xmlns:p14="http://schemas.microsoft.com/office/powerpoint/2010/main" xmlns:p15="http://schemas.microsoft.com/office/powerpoint/2012/main" xmlns:ahyp="http://schemas.microsoft.com/office/drawing/2018/hyperlinkcolor">
-  <p:cSld>
-    <p:spTree>
-      <p:nvGrpSpPr>
-        <p:cNvPr id="134" name="Shape 134"/>
-        <p:cNvGrpSpPr/>
-        <p:nvPr/>
-      </p:nvGrpSpPr>
-      <p:grpSpPr>
-        <a:xfrm>
-          <a:off x="0" y="0"/>
-          <a:ext cx="0" cy="0"/>
-          <a:chOff x="0" y="0"/>
-          <a:chExt cx="0" cy="0"/>
-        </a:xfrm>
-      </p:grpSpPr>
-      <p:sp>
-        <p:nvSpPr>
-          <p:cNvPr id="135" name="Google Shape;135;p24"/>
-          <p:cNvSpPr txBox="1"/>
-          <p:nvPr>
-            <p:ph type="title"/>
-          </p:nvPr>
-        </p:nvSpPr>
-        <p:spPr>
-          <a:xfrm>
-            <a:off x="471900" y="738725"/>
-            <a:ext cx="8222100" cy="767700"/>
-          </a:xfrm>
-          <a:prstGeom prst="rect">
-            <a:avLst/>
-          </a:prstGeom>
-        </p:spPr>
-        <p:txBody>
-          <a:bodyPr anchorCtr="0" anchor="b" bIns="91425" lIns="91425" spcFirstLastPara="1" rIns="91425" wrap="square" tIns="91425">
-            <a:normAutofit fontScale="90000"/>
-          </a:bodyPr>
-          <a:lstStyle/>
-          <a:p>
-            <a:pPr indent="0" lvl="0" marL="0" rtl="0" algn="l">
-              <a:spcBef>
-                <a:spcPts val="0"/>
-              </a:spcBef>
-              <a:spcAft>
-                <a:spcPts val="0"/>
-              </a:spcAft>
-              <a:buNone/>
-            </a:pPr>
-            <a:r>
-              <a:rPr lang="en-GB"/>
-              <a:t>Calculate accuracy score, Generate a confusion </a:t>
-            </a:r>
-            <a:r>
-              <a:rPr lang="en-GB"/>
-              <a:t>matrix</a:t>
-            </a:r>
-            <a:r>
-              <a:rPr lang="en-GB"/>
-              <a:t> and print the classification report </a:t>
-            </a:r>
-            <a:endParaRPr/>
-          </a:p>
-        </p:txBody>
-      </p:sp>
-      <p:sp>
-        <p:nvSpPr>
-          <p:cNvPr id="136" name="Google Shape;136;p24"/>
-          <p:cNvSpPr txBox="1"/>
-          <p:nvPr>
-            <p:ph idx="1" type="body"/>
-          </p:nvPr>
-        </p:nvSpPr>
-        <p:spPr>
-          <a:xfrm>
-            <a:off x="471900" y="1919075"/>
-            <a:ext cx="8222100" cy="2710200"/>
-          </a:xfrm>
-          <a:prstGeom prst="rect">
-            <a:avLst/>
-          </a:prstGeom>
-        </p:spPr>
-        <p:txBody>
-          <a:bodyPr anchorCtr="0" anchor="t" bIns="91425" lIns="91425" spcFirstLastPara="1" rIns="91425" wrap="square" tIns="91425">
-            <a:normAutofit/>
-          </a:bodyPr>
-          <a:lstStyle/>
-          <a:p>
-            <a:pPr indent="-330200" lvl="0" marL="457200" rtl="0" algn="l">
-              <a:spcBef>
-                <a:spcPts val="0"/>
-              </a:spcBef>
-              <a:spcAft>
-                <a:spcPts val="0"/>
-              </a:spcAft>
-              <a:buClr>
-                <a:srgbClr val="000000"/>
-              </a:buClr>
-              <a:buSzPts val="1600"/>
-              <a:buChar char="●"/>
-            </a:pPr>
-            <a:r>
-              <a:rPr lang="en-GB" sz="1600">
-                <a:solidFill>
-                  <a:srgbClr val="000000"/>
-                </a:solidFill>
-              </a:rPr>
-              <a:t>The results show that the model has an accuracy of 0.5789, with a precision of 0.82 for predicting when an employee will leave and a precision of 0.58 for predicting when an employee will stay. </a:t>
-            </a:r>
-            <a:endParaRPr sz="1600">
-              <a:solidFill>
-                <a:srgbClr val="000000"/>
-              </a:solidFill>
-            </a:endParaRPr>
-          </a:p>
-          <a:p>
-            <a:pPr indent="-330200" lvl="0" marL="457200" rtl="0" algn="l">
-              <a:spcBef>
-                <a:spcPts val="0"/>
-              </a:spcBef>
-              <a:spcAft>
-                <a:spcPts val="0"/>
-              </a:spcAft>
-              <a:buClr>
-                <a:srgbClr val="000000"/>
-              </a:buClr>
-              <a:buSzPts val="1600"/>
-              <a:buChar char="●"/>
-            </a:pPr>
-            <a:r>
-              <a:rPr lang="en-GB" sz="1600">
-                <a:solidFill>
-                  <a:srgbClr val="000000"/>
-                </a:solidFill>
-              </a:rPr>
-              <a:t>The model also has a recall of 0.96 for predicting when an employee will leave and a recall of 0.19 for predicting when an employee will stay. </a:t>
-            </a:r>
-            <a:endParaRPr sz="1600">
-              <a:solidFill>
-                <a:srgbClr val="000000"/>
-              </a:solidFill>
-            </a:endParaRPr>
-          </a:p>
-          <a:p>
-            <a:pPr indent="-330200" lvl="0" marL="457200" rtl="0" algn="l">
-              <a:spcBef>
-                <a:spcPts val="0"/>
-              </a:spcBef>
-              <a:spcAft>
-                <a:spcPts val="0"/>
-              </a:spcAft>
-              <a:buClr>
-                <a:srgbClr val="000000"/>
-              </a:buClr>
-              <a:buSzPts val="1600"/>
-              <a:buChar char="●"/>
-            </a:pPr>
-            <a:r>
-              <a:rPr lang="en-GB" sz="1600">
-                <a:solidFill>
-                  <a:srgbClr val="000000"/>
-                </a:solidFill>
-              </a:rPr>
-              <a:t>The f1-score for predicting when an employee will leave is 0.89 and the f1-score for predicting when an employee will stay is 0.29. </a:t>
-            </a:r>
-            <a:endParaRPr sz="1600">
-              <a:solidFill>
-                <a:srgbClr val="000000"/>
-              </a:solidFill>
-            </a:endParaRPr>
-          </a:p>
-          <a:p>
-            <a:pPr indent="-330200" lvl="0" marL="457200" rtl="0" algn="l">
-              <a:spcBef>
-                <a:spcPts val="0"/>
-              </a:spcBef>
-              <a:spcAft>
-                <a:spcPts val="0"/>
-              </a:spcAft>
-              <a:buClr>
-                <a:srgbClr val="000000"/>
-              </a:buClr>
-              <a:buSzPts val="1600"/>
-              <a:buChar char="●"/>
-            </a:pPr>
-            <a:r>
-              <a:rPr lang="en-GB" sz="1600">
-                <a:solidFill>
-                  <a:srgbClr val="000000"/>
-                </a:solidFill>
-              </a:rPr>
-              <a:t>The support for predicting when an employee will leave is 1991 and the support for predicting when an employee will stay is 509.</a:t>
-            </a:r>
-            <a:endParaRPr sz="1600">
-              <a:solidFill>
-                <a:srgbClr val="000000"/>
-              </a:solidFill>
-              <a:highlight>
-                <a:schemeClr val="lt1"/>
-              </a:highlight>
-            </a:endParaRPr>
-          </a:p>
-        </p:txBody>
-      </p:sp>
-    </p:spTree>
-  </p:cSld>
-  <p:clrMapOvr>
-    <a:masterClrMapping/>
-  </p:clrMapOvr>
-</p:sld>
-</file>
-
-<file path=ppt/slides/slide13.xml><?xml version="1.0" encoding="utf-8"?>
+<file path=ppt/slides/slide11.xml><?xml version="1.0" encoding="utf-8"?>
 <p:sld xmlns:a="http://schemas.openxmlformats.org/drawingml/2006/main" xmlns:r="http://schemas.openxmlformats.org/officeDocument/2006/relationships" xmlns:mc="http://schemas.openxmlformats.org/markup-compatibility/2006" xmlns:mv="urn:schemas-microsoft-com:mac:vml" xmlns:p="http://schemas.openxmlformats.org/presentationml/2006/main" xmlns:c="http://schemas.openxmlformats.org/drawingml/2006/chart" xmlns:dgm="http://schemas.openxmlformats.org/drawingml/2006/diagram" xmlns:o="urn:schemas-microsoft-com:office:office" xmlns:v="urn:schemas-microsoft-com:vml" xmlns:pvml="urn:schemas-microsoft-com:office:powerpoint" xmlns:com="http://schemas.openxmlformats.org/drawingml/2006/compatibility" xmlns:p14="http://schemas.microsoft.com/office/powerpoint/2010/main" xmlns:p15="http://schemas.microsoft.com/office/powerpoint/2012/main" xmlns:ahyp="http://schemas.microsoft.com/office/drawing/2018/hyperlinkcolor">
   <p:cSld>
     <p:spTree>
@@ -9245,7 +9027,7 @@
       </p:grpSpPr>
       <p:sp>
         <p:nvSpPr>
-          <p:cNvPr id="141" name="Google Shape;141;p25"/>
+          <p:cNvPr id="141" name="Google Shape;141;p23"/>
           <p:cNvSpPr txBox="1"/>
           <p:nvPr>
             <p:ph type="title"/>
@@ -9262,7 +9044,7 @@
         </p:spPr>
         <p:txBody>
           <a:bodyPr anchorCtr="0" anchor="b" bIns="91425" lIns="91425" spcFirstLastPara="1" rIns="91425" wrap="square" tIns="91425">
-            <a:normAutofit/>
+            <a:normAutofit fontScale="90000"/>
           </a:bodyPr>
           <a:lstStyle/>
           <a:p>
@@ -9277,38 +9059,7 @@
             </a:pPr>
             <a:r>
               <a:rPr lang="en-GB"/>
-              <a:t>Using the </a:t>
-            </a:r>
-            <a:r>
-              <a:rPr b="1" lang="en-GB" sz="1300">
-                <a:highlight>
-                  <a:schemeClr val="dk1"/>
-                </a:highlight>
-                <a:latin typeface="Arial"/>
-                <a:ea typeface="Arial"/>
-                <a:cs typeface="Arial"/>
-                <a:sym typeface="Arial"/>
-              </a:rPr>
-              <a:t>RandomOverSampler</a:t>
-            </a:r>
-            <a:r>
-              <a:rPr b="1" lang="en-GB" sz="1300">
-                <a:solidFill>
-                  <a:srgbClr val="000000"/>
-                </a:solidFill>
-                <a:highlight>
-                  <a:schemeClr val="dk1"/>
-                </a:highlight>
-                <a:latin typeface="Arial"/>
-                <a:ea typeface="Arial"/>
-                <a:cs typeface="Arial"/>
-                <a:sym typeface="Arial"/>
-              </a:rPr>
-              <a:t> </a:t>
-            </a:r>
-            <a:r>
-              <a:rPr lang="en-GB"/>
-              <a:t>to resample the data</a:t>
+              <a:t>Logistic Regression Model using training data</a:t>
             </a:r>
             <a:endParaRPr/>
           </a:p>
@@ -9316,7 +9067,7 @@
       </p:sp>
       <p:sp>
         <p:nvSpPr>
-          <p:cNvPr id="142" name="Google Shape;142;p25"/>
+          <p:cNvPr id="142" name="Google Shape;142;p23"/>
           <p:cNvSpPr txBox="1"/>
           <p:nvPr>
             <p:ph idx="1" type="body"/>
@@ -9337,14 +9088,18 @@
           </a:bodyPr>
           <a:lstStyle/>
           <a:p>
-            <a:pPr indent="0" lvl="0" marL="0" rtl="0" algn="l">
-              <a:spcBef>
-                <a:spcPts val="0"/>
-              </a:spcBef>
-              <a:spcAft>
-                <a:spcPts val="1200"/>
-              </a:spcAft>
-              <a:buNone/>
+            <a:pPr indent="-330200" lvl="0" marL="457200" rtl="0" algn="l">
+              <a:spcBef>
+                <a:spcPts val="0"/>
+              </a:spcBef>
+              <a:spcAft>
+                <a:spcPts val="0"/>
+              </a:spcAft>
+              <a:buClr>
+                <a:srgbClr val="000000"/>
+              </a:buClr>
+              <a:buSzPts val="1600"/>
+              <a:buChar char="●"/>
             </a:pPr>
             <a:r>
               <a:rPr lang="en-GB" sz="1600">
@@ -9352,30 +9107,54 @@
                   <a:srgbClr val="000000"/>
                 </a:solidFill>
               </a:rPr>
-              <a:t>We used the RandomOverSampler module from the imbalanced-learn library to resample the data and balance the labels. We instantiated the random oversampler model, set the random_state parameter to 1, and fit the original training data to the model. We then counted the distinct values of the resampled labels data and confirmed that the labels now have an equal number of data points.</a:t>
-            </a:r>
-            <a:endParaRPr sz="2200"/>
+              <a:t>We imported the LogisticRegression module from the sklearn library and instantiated a Logistic Regression model using the LogisticRegression class. We set the solver parameter to 'lbfgs' and the random_state parameter to 1. We then fit the model to the training data using the fit method of the LogisticRegression class, passing in the training data and the target variable. </a:t>
+            </a:r>
+            <a:endParaRPr sz="1600">
+              <a:solidFill>
+                <a:srgbClr val="000000"/>
+              </a:solidFill>
+            </a:endParaRPr>
+          </a:p>
+          <a:p>
+            <a:pPr indent="-355600" lvl="0" marL="457200" rtl="0" algn="l">
+              <a:spcBef>
+                <a:spcPts val="0"/>
+              </a:spcBef>
+              <a:spcAft>
+                <a:spcPts val="0"/>
+              </a:spcAft>
+              <a:buClr>
+                <a:srgbClr val="000000"/>
+              </a:buClr>
+              <a:buSzPts val="2000"/>
+              <a:buChar char="●"/>
+            </a:pPr>
+            <a:r>
+              <a:rPr lang="en-GB" sz="1600">
+                <a:solidFill>
+                  <a:srgbClr val="000000"/>
+                </a:solidFill>
+              </a:rPr>
+              <a:t>Finally, we used the testing data to make predictions using the predict method and stored the predictions in a variable called "predictions".</a:t>
+            </a:r>
+            <a:endParaRPr sz="2000">
+              <a:solidFill>
+                <a:srgbClr val="000000"/>
+              </a:solidFill>
+            </a:endParaRPr>
           </a:p>
         </p:txBody>
       </p:sp>
-      <p:pic>
-        <p:nvPicPr>
-          <p:cNvPr id="143" name="Google Shape;143;p25"/>
-          <p:cNvPicPr preferRelativeResize="0"/>
+      <p:sp>
+        <p:nvSpPr>
+          <p:cNvPr id="143" name="Google Shape;143;p23"/>
+          <p:cNvSpPr txBox="1"/>
           <p:nvPr/>
-        </p:nvPicPr>
-        <p:blipFill>
-          <a:blip r:embed="rId3">
-            <a:alphaModFix/>
-          </a:blip>
-          <a:stretch>
-            <a:fillRect/>
-          </a:stretch>
-        </p:blipFill>
+        </p:nvSpPr>
         <p:spPr>
           <a:xfrm>
-            <a:off x="601575" y="3585400"/>
-            <a:ext cx="5719826" cy="1558100"/>
+            <a:off x="5986825" y="369425"/>
+            <a:ext cx="3000000" cy="369300"/>
           </a:xfrm>
           <a:prstGeom prst="rect">
             <a:avLst/>
@@ -9385,7 +9164,37 @@
             <a:noFill/>
           </a:ln>
         </p:spPr>
-      </p:pic>
+        <p:txBody>
+          <a:bodyPr anchorCtr="0" anchor="t" bIns="91425" lIns="91425" spcFirstLastPara="1" rIns="91425" wrap="square" tIns="91425">
+            <a:spAutoFit/>
+          </a:bodyPr>
+          <a:lstStyle/>
+          <a:p>
+            <a:pPr indent="0" lvl="0" marL="0" rtl="0" algn="l">
+              <a:spcBef>
+                <a:spcPts val="0"/>
+              </a:spcBef>
+              <a:spcAft>
+                <a:spcPts val="0"/>
+              </a:spcAft>
+              <a:buNone/>
+            </a:pPr>
+            <a:r>
+              <a:rPr lang="en-GB" sz="1200">
+                <a:solidFill>
+                  <a:schemeClr val="lt1"/>
+                </a:solidFill>
+                <a:latin typeface="Roboto"/>
+                <a:ea typeface="Roboto"/>
+                <a:cs typeface="Roboto"/>
+                <a:sym typeface="Roboto"/>
+              </a:rPr>
+              <a:t>Logistic Regression Model</a:t>
+            </a:r>
+            <a:endParaRPr sz="1200"/>
+          </a:p>
+        </p:txBody>
+      </p:sp>
     </p:spTree>
   </p:cSld>
   <p:clrMapOvr>
@@ -9394,7 +9203,7 @@
 </p:sld>
 </file>
 
-<file path=ppt/slides/slide14.xml><?xml version="1.0" encoding="utf-8"?>
+<file path=ppt/slides/slide12.xml><?xml version="1.0" encoding="utf-8"?>
 <p:sld xmlns:a="http://schemas.openxmlformats.org/drawingml/2006/main" xmlns:r="http://schemas.openxmlformats.org/officeDocument/2006/relationships" xmlns:mc="http://schemas.openxmlformats.org/markup-compatibility/2006" xmlns:mv="urn:schemas-microsoft-com:mac:vml" xmlns:p="http://schemas.openxmlformats.org/presentationml/2006/main" xmlns:c="http://schemas.openxmlformats.org/drawingml/2006/chart" xmlns:dgm="http://schemas.openxmlformats.org/drawingml/2006/diagram" xmlns:o="urn:schemas-microsoft-com:office:office" xmlns:v="urn:schemas-microsoft-com:vml" xmlns:pvml="urn:schemas-microsoft-com:office:powerpoint" xmlns:com="http://schemas.openxmlformats.org/drawingml/2006/compatibility" xmlns:p14="http://schemas.microsoft.com/office/powerpoint/2010/main" xmlns:p15="http://schemas.microsoft.com/office/powerpoint/2012/main" xmlns:ahyp="http://schemas.microsoft.com/office/drawing/2018/hyperlinkcolor">
   <p:cSld>
     <p:spTree>
@@ -9413,7 +9222,7 @@
       </p:grpSpPr>
       <p:sp>
         <p:nvSpPr>
-          <p:cNvPr id="148" name="Google Shape;148;p26"/>
+          <p:cNvPr id="148" name="Google Shape;148;p24"/>
           <p:cNvSpPr txBox="1"/>
           <p:nvPr>
             <p:ph type="title"/>
@@ -9445,19 +9254,15 @@
             </a:pPr>
             <a:r>
               <a:rPr lang="en-GB"/>
-              <a:t>Using the LogisticRegression </a:t>
+              <a:t>Calculate accuracy score, Generate a confusion </a:t>
             </a:r>
             <a:r>
               <a:rPr lang="en-GB"/>
-              <a:t>classifier</a:t>
+              <a:t>matrix</a:t>
             </a:r>
             <a:r>
               <a:rPr lang="en-GB"/>
-              <a:t> and the resampled data to fit the </a:t>
-            </a:r>
-            <a:r>
-              <a:rPr lang="en-GB"/>
-              <a:t>model.</a:t>
+              <a:t> and print the classification report </a:t>
             </a:r>
             <a:endParaRPr/>
           </a:p>
@@ -9465,7 +9270,7 @@
       </p:sp>
       <p:sp>
         <p:nvSpPr>
-          <p:cNvPr id="149" name="Google Shape;149;p26"/>
+          <p:cNvPr id="149" name="Google Shape;149;p24"/>
           <p:cNvSpPr txBox="1"/>
           <p:nvPr>
             <p:ph idx="1" type="body"/>
@@ -9486,6 +9291,490 @@
           </a:bodyPr>
           <a:lstStyle/>
           <a:p>
+            <a:pPr indent="-330200" lvl="0" marL="457200" rtl="0" algn="l">
+              <a:spcBef>
+                <a:spcPts val="0"/>
+              </a:spcBef>
+              <a:spcAft>
+                <a:spcPts val="0"/>
+              </a:spcAft>
+              <a:buClr>
+                <a:srgbClr val="000000"/>
+              </a:buClr>
+              <a:buSzPts val="1600"/>
+              <a:buChar char="●"/>
+            </a:pPr>
+            <a:r>
+              <a:rPr lang="en-GB" sz="1600">
+                <a:solidFill>
+                  <a:srgbClr val="000000"/>
+                </a:solidFill>
+              </a:rPr>
+              <a:t>The results show that the model has an accuracy of 0.5789, with a precision of 0.82 for predicting when an employee will leave and a precision of 0.58 for predicting when an employee will stay. </a:t>
+            </a:r>
+            <a:endParaRPr sz="1600">
+              <a:solidFill>
+                <a:srgbClr val="000000"/>
+              </a:solidFill>
+            </a:endParaRPr>
+          </a:p>
+          <a:p>
+            <a:pPr indent="-330200" lvl="0" marL="457200" rtl="0" algn="l">
+              <a:spcBef>
+                <a:spcPts val="0"/>
+              </a:spcBef>
+              <a:spcAft>
+                <a:spcPts val="0"/>
+              </a:spcAft>
+              <a:buClr>
+                <a:srgbClr val="000000"/>
+              </a:buClr>
+              <a:buSzPts val="1600"/>
+              <a:buChar char="●"/>
+            </a:pPr>
+            <a:r>
+              <a:rPr lang="en-GB" sz="1600">
+                <a:solidFill>
+                  <a:srgbClr val="000000"/>
+                </a:solidFill>
+              </a:rPr>
+              <a:t>The model also has a recall of 0.96 for predicting when an employee will leave and a recall of 0.19 for predicting when an employee will stay. </a:t>
+            </a:r>
+            <a:endParaRPr sz="1600">
+              <a:solidFill>
+                <a:srgbClr val="000000"/>
+              </a:solidFill>
+            </a:endParaRPr>
+          </a:p>
+          <a:p>
+            <a:pPr indent="-330200" lvl="0" marL="457200" rtl="0" algn="l">
+              <a:spcBef>
+                <a:spcPts val="0"/>
+              </a:spcBef>
+              <a:spcAft>
+                <a:spcPts val="0"/>
+              </a:spcAft>
+              <a:buClr>
+                <a:srgbClr val="000000"/>
+              </a:buClr>
+              <a:buSzPts val="1600"/>
+              <a:buChar char="●"/>
+            </a:pPr>
+            <a:r>
+              <a:rPr lang="en-GB" sz="1600">
+                <a:solidFill>
+                  <a:srgbClr val="000000"/>
+                </a:solidFill>
+              </a:rPr>
+              <a:t>The f1-score for predicting when an employee will leave is 0.89 and the f1-score for predicting when an employee will stay is 0.29. </a:t>
+            </a:r>
+            <a:endParaRPr sz="1600">
+              <a:solidFill>
+                <a:srgbClr val="000000"/>
+              </a:solidFill>
+            </a:endParaRPr>
+          </a:p>
+          <a:p>
+            <a:pPr indent="-330200" lvl="0" marL="457200" rtl="0" algn="l">
+              <a:spcBef>
+                <a:spcPts val="0"/>
+              </a:spcBef>
+              <a:spcAft>
+                <a:spcPts val="0"/>
+              </a:spcAft>
+              <a:buClr>
+                <a:srgbClr val="000000"/>
+              </a:buClr>
+              <a:buSzPts val="1600"/>
+              <a:buChar char="●"/>
+            </a:pPr>
+            <a:r>
+              <a:rPr lang="en-GB" sz="1600">
+                <a:solidFill>
+                  <a:srgbClr val="000000"/>
+                </a:solidFill>
+              </a:rPr>
+              <a:t>The support for predicting when an employee will leave is 1991 and the support for predicting when an employee will stay is 509.</a:t>
+            </a:r>
+            <a:endParaRPr sz="1600">
+              <a:solidFill>
+                <a:srgbClr val="000000"/>
+              </a:solidFill>
+              <a:highlight>
+                <a:schemeClr val="lt1"/>
+              </a:highlight>
+            </a:endParaRPr>
+          </a:p>
+        </p:txBody>
+      </p:sp>
+      <p:sp>
+        <p:nvSpPr>
+          <p:cNvPr id="150" name="Google Shape;150;p24"/>
+          <p:cNvSpPr txBox="1"/>
+          <p:nvPr/>
+        </p:nvSpPr>
+        <p:spPr>
+          <a:xfrm>
+            <a:off x="6144000" y="226350"/>
+            <a:ext cx="3000000" cy="369300"/>
+          </a:xfrm>
+          <a:prstGeom prst="rect">
+            <a:avLst/>
+          </a:prstGeom>
+          <a:noFill/>
+          <a:ln>
+            <a:noFill/>
+          </a:ln>
+        </p:spPr>
+        <p:txBody>
+          <a:bodyPr anchorCtr="0" anchor="t" bIns="91425" lIns="91425" spcFirstLastPara="1" rIns="91425" wrap="square" tIns="91425">
+            <a:spAutoFit/>
+          </a:bodyPr>
+          <a:lstStyle/>
+          <a:p>
+            <a:pPr indent="0" lvl="0" marL="0" rtl="0" algn="l">
+              <a:spcBef>
+                <a:spcPts val="0"/>
+              </a:spcBef>
+              <a:spcAft>
+                <a:spcPts val="0"/>
+              </a:spcAft>
+              <a:buNone/>
+            </a:pPr>
+            <a:r>
+              <a:rPr lang="en-GB" sz="1200">
+                <a:solidFill>
+                  <a:schemeClr val="lt1"/>
+                </a:solidFill>
+                <a:latin typeface="Roboto"/>
+                <a:ea typeface="Roboto"/>
+                <a:cs typeface="Roboto"/>
+                <a:sym typeface="Roboto"/>
+              </a:rPr>
+              <a:t>Logistic Regression Model</a:t>
+            </a:r>
+            <a:endParaRPr sz="1200"/>
+          </a:p>
+        </p:txBody>
+      </p:sp>
+    </p:spTree>
+  </p:cSld>
+  <p:clrMapOvr>
+    <a:masterClrMapping/>
+  </p:clrMapOvr>
+</p:sld>
+</file>
+
+<file path=ppt/slides/slide13.xml><?xml version="1.0" encoding="utf-8"?>
+<p:sld xmlns:a="http://schemas.openxmlformats.org/drawingml/2006/main" xmlns:r="http://schemas.openxmlformats.org/officeDocument/2006/relationships" xmlns:mc="http://schemas.openxmlformats.org/markup-compatibility/2006" xmlns:mv="urn:schemas-microsoft-com:mac:vml" xmlns:p="http://schemas.openxmlformats.org/presentationml/2006/main" xmlns:c="http://schemas.openxmlformats.org/drawingml/2006/chart" xmlns:dgm="http://schemas.openxmlformats.org/drawingml/2006/diagram" xmlns:o="urn:schemas-microsoft-com:office:office" xmlns:v="urn:schemas-microsoft-com:vml" xmlns:pvml="urn:schemas-microsoft-com:office:powerpoint" xmlns:com="http://schemas.openxmlformats.org/drawingml/2006/compatibility" xmlns:p14="http://schemas.microsoft.com/office/powerpoint/2010/main" xmlns:p15="http://schemas.microsoft.com/office/powerpoint/2012/main" xmlns:ahyp="http://schemas.microsoft.com/office/drawing/2018/hyperlinkcolor">
+  <p:cSld>
+    <p:spTree>
+      <p:nvGrpSpPr>
+        <p:cNvPr id="154" name="Shape 154"/>
+        <p:cNvGrpSpPr/>
+        <p:nvPr/>
+      </p:nvGrpSpPr>
+      <p:grpSpPr>
+        <a:xfrm>
+          <a:off x="0" y="0"/>
+          <a:ext cx="0" cy="0"/>
+          <a:chOff x="0" y="0"/>
+          <a:chExt cx="0" cy="0"/>
+        </a:xfrm>
+      </p:grpSpPr>
+      <p:sp>
+        <p:nvSpPr>
+          <p:cNvPr id="155" name="Google Shape;155;p25"/>
+          <p:cNvSpPr txBox="1"/>
+          <p:nvPr>
+            <p:ph type="title"/>
+          </p:nvPr>
+        </p:nvSpPr>
+        <p:spPr>
+          <a:xfrm>
+            <a:off x="471900" y="738725"/>
+            <a:ext cx="8222100" cy="767700"/>
+          </a:xfrm>
+          <a:prstGeom prst="rect">
+            <a:avLst/>
+          </a:prstGeom>
+        </p:spPr>
+        <p:txBody>
+          <a:bodyPr anchorCtr="0" anchor="b" bIns="91425" lIns="91425" spcFirstLastPara="1" rIns="91425" wrap="square" tIns="91425">
+            <a:normAutofit/>
+          </a:bodyPr>
+          <a:lstStyle/>
+          <a:p>
+            <a:pPr indent="0" lvl="0" marL="0" rtl="0" algn="l">
+              <a:spcBef>
+                <a:spcPts val="0"/>
+              </a:spcBef>
+              <a:spcAft>
+                <a:spcPts val="0"/>
+              </a:spcAft>
+              <a:buNone/>
+            </a:pPr>
+            <a:r>
+              <a:rPr lang="en-GB"/>
+              <a:t>Using the </a:t>
+            </a:r>
+            <a:r>
+              <a:rPr b="1" lang="en-GB" sz="1300">
+                <a:highlight>
+                  <a:schemeClr val="dk1"/>
+                </a:highlight>
+                <a:latin typeface="Arial"/>
+                <a:ea typeface="Arial"/>
+                <a:cs typeface="Arial"/>
+                <a:sym typeface="Arial"/>
+              </a:rPr>
+              <a:t>RandomOverSampler</a:t>
+            </a:r>
+            <a:r>
+              <a:rPr b="1" lang="en-GB" sz="1300">
+                <a:solidFill>
+                  <a:srgbClr val="000000"/>
+                </a:solidFill>
+                <a:highlight>
+                  <a:schemeClr val="dk1"/>
+                </a:highlight>
+                <a:latin typeface="Arial"/>
+                <a:ea typeface="Arial"/>
+                <a:cs typeface="Arial"/>
+                <a:sym typeface="Arial"/>
+              </a:rPr>
+              <a:t> </a:t>
+            </a:r>
+            <a:r>
+              <a:rPr lang="en-GB"/>
+              <a:t>to resample the data</a:t>
+            </a:r>
+            <a:endParaRPr/>
+          </a:p>
+        </p:txBody>
+      </p:sp>
+      <p:sp>
+        <p:nvSpPr>
+          <p:cNvPr id="156" name="Google Shape;156;p25"/>
+          <p:cNvSpPr txBox="1"/>
+          <p:nvPr>
+            <p:ph idx="1" type="body"/>
+          </p:nvPr>
+        </p:nvSpPr>
+        <p:spPr>
+          <a:xfrm>
+            <a:off x="471900" y="1919075"/>
+            <a:ext cx="8222100" cy="2710200"/>
+          </a:xfrm>
+          <a:prstGeom prst="rect">
+            <a:avLst/>
+          </a:prstGeom>
+        </p:spPr>
+        <p:txBody>
+          <a:bodyPr anchorCtr="0" anchor="t" bIns="91425" lIns="91425" spcFirstLastPara="1" rIns="91425" wrap="square" tIns="91425">
+            <a:normAutofit/>
+          </a:bodyPr>
+          <a:lstStyle/>
+          <a:p>
+            <a:pPr indent="0" lvl="0" marL="0" rtl="0" algn="l">
+              <a:spcBef>
+                <a:spcPts val="0"/>
+              </a:spcBef>
+              <a:spcAft>
+                <a:spcPts val="1200"/>
+              </a:spcAft>
+              <a:buNone/>
+            </a:pPr>
+            <a:r>
+              <a:rPr lang="en-GB" sz="1600">
+                <a:solidFill>
+                  <a:srgbClr val="000000"/>
+                </a:solidFill>
+              </a:rPr>
+              <a:t>We used the RandomOverSampler module from the imbalanced-learn library to resample the data and balance the labels. We instantiated the random oversampler model, set the random_state parameter to 1, and fit the original training data to the model. We then counted the distinct values of the resampled labels data and confirmed that the labels now have an equal number of data points.</a:t>
+            </a:r>
+            <a:endParaRPr sz="2200"/>
+          </a:p>
+        </p:txBody>
+      </p:sp>
+      <p:pic>
+        <p:nvPicPr>
+          <p:cNvPr id="157" name="Google Shape;157;p25"/>
+          <p:cNvPicPr preferRelativeResize="0"/>
+          <p:nvPr/>
+        </p:nvPicPr>
+        <p:blipFill>
+          <a:blip r:embed="rId3">
+            <a:alphaModFix/>
+          </a:blip>
+          <a:stretch>
+            <a:fillRect/>
+          </a:stretch>
+        </p:blipFill>
+        <p:spPr>
+          <a:xfrm>
+            <a:off x="601575" y="3585400"/>
+            <a:ext cx="5719826" cy="1558100"/>
+          </a:xfrm>
+          <a:prstGeom prst="rect">
+            <a:avLst/>
+          </a:prstGeom>
+          <a:noFill/>
+          <a:ln>
+            <a:noFill/>
+          </a:ln>
+        </p:spPr>
+      </p:pic>
+      <p:sp>
+        <p:nvSpPr>
+          <p:cNvPr id="158" name="Google Shape;158;p25"/>
+          <p:cNvSpPr txBox="1"/>
+          <p:nvPr/>
+        </p:nvSpPr>
+        <p:spPr>
+          <a:xfrm>
+            <a:off x="5694000" y="230325"/>
+            <a:ext cx="3000000" cy="369300"/>
+          </a:xfrm>
+          <a:prstGeom prst="rect">
+            <a:avLst/>
+          </a:prstGeom>
+          <a:noFill/>
+          <a:ln>
+            <a:noFill/>
+          </a:ln>
+        </p:spPr>
+        <p:txBody>
+          <a:bodyPr anchorCtr="0" anchor="t" bIns="91425" lIns="91425" spcFirstLastPara="1" rIns="91425" wrap="square" tIns="91425">
+            <a:spAutoFit/>
+          </a:bodyPr>
+          <a:lstStyle/>
+          <a:p>
+            <a:pPr indent="0" lvl="0" marL="0" rtl="0" algn="l">
+              <a:spcBef>
+                <a:spcPts val="0"/>
+              </a:spcBef>
+              <a:spcAft>
+                <a:spcPts val="0"/>
+              </a:spcAft>
+              <a:buNone/>
+            </a:pPr>
+            <a:r>
+              <a:rPr lang="en-GB" sz="1200">
+                <a:solidFill>
+                  <a:schemeClr val="lt1"/>
+                </a:solidFill>
+                <a:latin typeface="Roboto"/>
+                <a:ea typeface="Roboto"/>
+                <a:cs typeface="Roboto"/>
+                <a:sym typeface="Roboto"/>
+              </a:rPr>
+              <a:t>Logistic Regression Model</a:t>
+            </a:r>
+            <a:endParaRPr sz="1200"/>
+          </a:p>
+        </p:txBody>
+      </p:sp>
+    </p:spTree>
+  </p:cSld>
+  <p:clrMapOvr>
+    <a:masterClrMapping/>
+  </p:clrMapOvr>
+</p:sld>
+</file>
+
+<file path=ppt/slides/slide14.xml><?xml version="1.0" encoding="utf-8"?>
+<p:sld xmlns:a="http://schemas.openxmlformats.org/drawingml/2006/main" xmlns:r="http://schemas.openxmlformats.org/officeDocument/2006/relationships" xmlns:mc="http://schemas.openxmlformats.org/markup-compatibility/2006" xmlns:mv="urn:schemas-microsoft-com:mac:vml" xmlns:p="http://schemas.openxmlformats.org/presentationml/2006/main" xmlns:c="http://schemas.openxmlformats.org/drawingml/2006/chart" xmlns:dgm="http://schemas.openxmlformats.org/drawingml/2006/diagram" xmlns:o="urn:schemas-microsoft-com:office:office" xmlns:v="urn:schemas-microsoft-com:vml" xmlns:pvml="urn:schemas-microsoft-com:office:powerpoint" xmlns:com="http://schemas.openxmlformats.org/drawingml/2006/compatibility" xmlns:p14="http://schemas.microsoft.com/office/powerpoint/2010/main" xmlns:p15="http://schemas.microsoft.com/office/powerpoint/2012/main" xmlns:ahyp="http://schemas.microsoft.com/office/drawing/2018/hyperlinkcolor">
+  <p:cSld>
+    <p:spTree>
+      <p:nvGrpSpPr>
+        <p:cNvPr id="162" name="Shape 162"/>
+        <p:cNvGrpSpPr/>
+        <p:nvPr/>
+      </p:nvGrpSpPr>
+      <p:grpSpPr>
+        <a:xfrm>
+          <a:off x="0" y="0"/>
+          <a:ext cx="0" cy="0"/>
+          <a:chOff x="0" y="0"/>
+          <a:chExt cx="0" cy="0"/>
+        </a:xfrm>
+      </p:grpSpPr>
+      <p:sp>
+        <p:nvSpPr>
+          <p:cNvPr id="163" name="Google Shape;163;p26"/>
+          <p:cNvSpPr txBox="1"/>
+          <p:nvPr>
+            <p:ph type="title"/>
+          </p:nvPr>
+        </p:nvSpPr>
+        <p:spPr>
+          <a:xfrm>
+            <a:off x="471900" y="738725"/>
+            <a:ext cx="8222100" cy="767700"/>
+          </a:xfrm>
+          <a:prstGeom prst="rect">
+            <a:avLst/>
+          </a:prstGeom>
+        </p:spPr>
+        <p:txBody>
+          <a:bodyPr anchorCtr="0" anchor="b" bIns="91425" lIns="91425" spcFirstLastPara="1" rIns="91425" wrap="square" tIns="91425">
+            <a:normAutofit fontScale="90000"/>
+          </a:bodyPr>
+          <a:lstStyle/>
+          <a:p>
+            <a:pPr indent="0" lvl="0" marL="0" rtl="0" algn="l">
+              <a:spcBef>
+                <a:spcPts val="0"/>
+              </a:spcBef>
+              <a:spcAft>
+                <a:spcPts val="0"/>
+              </a:spcAft>
+              <a:buNone/>
+            </a:pPr>
+            <a:r>
+              <a:rPr lang="en-GB"/>
+              <a:t>Using the LogisticRegression </a:t>
+            </a:r>
+            <a:r>
+              <a:rPr lang="en-GB"/>
+              <a:t>classifier</a:t>
+            </a:r>
+            <a:r>
+              <a:rPr lang="en-GB"/>
+              <a:t> and the resampled data to fit the </a:t>
+            </a:r>
+            <a:r>
+              <a:rPr lang="en-GB"/>
+              <a:t>model.</a:t>
+            </a:r>
+            <a:endParaRPr/>
+          </a:p>
+        </p:txBody>
+      </p:sp>
+      <p:sp>
+        <p:nvSpPr>
+          <p:cNvPr id="164" name="Google Shape;164;p26"/>
+          <p:cNvSpPr txBox="1"/>
+          <p:nvPr>
+            <p:ph idx="1" type="body"/>
+          </p:nvPr>
+        </p:nvSpPr>
+        <p:spPr>
+          <a:xfrm>
+            <a:off x="471900" y="1919075"/>
+            <a:ext cx="8222100" cy="2710200"/>
+          </a:xfrm>
+          <a:prstGeom prst="rect">
+            <a:avLst/>
+          </a:prstGeom>
+        </p:spPr>
+        <p:txBody>
+          <a:bodyPr anchorCtr="0" anchor="t" bIns="91425" lIns="91425" spcFirstLastPara="1" rIns="91425" wrap="square" tIns="91425">
+            <a:normAutofit/>
+          </a:bodyPr>
+          <a:lstStyle/>
+          <a:p>
             <a:pPr indent="0" lvl="0" marL="0" rtl="0" algn="l">
               <a:spcBef>
                 <a:spcPts val="0"/>
@@ -9520,6 +9809,56 @@
               <a:t>.</a:t>
             </a:r>
             <a:endParaRPr sz="2400"/>
+          </a:p>
+        </p:txBody>
+      </p:sp>
+      <p:sp>
+        <p:nvSpPr>
+          <p:cNvPr id="165" name="Google Shape;165;p26"/>
+          <p:cNvSpPr txBox="1"/>
+          <p:nvPr/>
+        </p:nvSpPr>
+        <p:spPr>
+          <a:xfrm>
+            <a:off x="5962350" y="140725"/>
+            <a:ext cx="3000000" cy="369300"/>
+          </a:xfrm>
+          <a:prstGeom prst="rect">
+            <a:avLst/>
+          </a:prstGeom>
+          <a:noFill/>
+          <a:ln>
+            <a:noFill/>
+          </a:ln>
+        </p:spPr>
+        <p:txBody>
+          <a:bodyPr anchorCtr="0" anchor="t" bIns="91425" lIns="91425" spcFirstLastPara="1" rIns="91425" wrap="square" tIns="91425">
+            <a:spAutoFit/>
+          </a:bodyPr>
+          <a:lstStyle/>
+          <a:p>
+            <a:pPr indent="0" lvl="0" marL="0" rtl="0" algn="l">
+              <a:spcBef>
+                <a:spcPts val="0"/>
+              </a:spcBef>
+              <a:spcAft>
+                <a:spcPts val="0"/>
+              </a:spcAft>
+              <a:buNone/>
+            </a:pPr>
+            <a:r>
+              <a:rPr lang="en-GB" sz="1200">
+                <a:solidFill>
+                  <a:schemeClr val="lt1"/>
+                </a:solidFill>
+                <a:latin typeface="Roboto"/>
+                <a:ea typeface="Roboto"/>
+                <a:cs typeface="Roboto"/>
+                <a:sym typeface="Roboto"/>
+              </a:rPr>
+              <a:t>Logistic Regression Model</a:t>
+            </a:r>
+            <a:endParaRPr sz="1200"/>
           </a:p>
         </p:txBody>
       </p:sp>
@@ -9536,7 +9875,7 @@
   <p:cSld>
     <p:spTree>
       <p:nvGrpSpPr>
-        <p:cNvPr id="153" name="Shape 153"/>
+        <p:cNvPr id="169" name="Shape 169"/>
         <p:cNvGrpSpPr/>
         <p:nvPr/>
       </p:nvGrpSpPr>
@@ -9550,7 +9889,7 @@
       </p:grpSpPr>
       <p:sp>
         <p:nvSpPr>
-          <p:cNvPr id="154" name="Google Shape;154;p27"/>
+          <p:cNvPr id="170" name="Google Shape;170;p27"/>
           <p:cNvSpPr txBox="1"/>
           <p:nvPr>
             <p:ph type="title"/>
@@ -9567,7 +9906,7 @@
         </p:spPr>
         <p:txBody>
           <a:bodyPr anchorCtr="0" anchor="b" bIns="91425" lIns="91425" spcFirstLastPara="1" rIns="91425" wrap="square" tIns="91425">
-            <a:normAutofit fontScale="90000"/>
+            <a:normAutofit/>
           </a:bodyPr>
           <a:lstStyle/>
           <a:p>
@@ -9582,7 +9921,7 @@
             </a:pPr>
             <a:r>
               <a:rPr lang="en-GB"/>
-              <a:t>Calculate accuracy score, Generate a confusion matrix and print the classification report </a:t>
+              <a:t>Evaluating the model</a:t>
             </a:r>
             <a:endParaRPr/>
           </a:p>
@@ -9590,7 +9929,7 @@
       </p:sp>
       <p:sp>
         <p:nvSpPr>
-          <p:cNvPr id="155" name="Google Shape;155;p27"/>
+          <p:cNvPr id="171" name="Google Shape;171;p27"/>
           <p:cNvSpPr txBox="1"/>
           <p:nvPr>
             <p:ph idx="1" type="body"/>
@@ -9611,26 +9950,17 @@
           </a:bodyPr>
           <a:lstStyle/>
           <a:p>
-            <a:pPr indent="-317500" lvl="0" marL="457200" rtl="0" algn="l">
-              <a:spcBef>
-                <a:spcPts val="0"/>
-              </a:spcBef>
-              <a:spcAft>
-                <a:spcPts val="0"/>
-              </a:spcAft>
-              <a:buClr>
-                <a:srgbClr val="000000"/>
-              </a:buClr>
-              <a:buSzPts val="1400"/>
-              <a:buChar char="●"/>
-            </a:pPr>
-            <a:r>
-              <a:rPr lang="en-GB" sz="1400">
-                <a:solidFill>
-                  <a:srgbClr val="000000"/>
-                </a:solidFill>
-              </a:rPr>
-              <a:t>We used the RandomOverSampler module from the imbalanced-learn library to resample the training data in order to balance the label classes. We then instantiated a Logistic Regression model and fitted it to the resampled data using the fit method. We made predictions on the testing data using the predict method. </a:t>
+            <a:pPr indent="0" lvl="0" marL="0" rtl="0" algn="l">
+              <a:spcBef>
+                <a:spcPts val="0"/>
+              </a:spcBef>
+              <a:spcAft>
+                <a:spcPts val="0"/>
+              </a:spcAft>
+              <a:buNone/>
+            </a:pPr>
+            <a:r>
+              <a:t/>
             </a:r>
             <a:endParaRPr sz="1400">
               <a:solidFill>
@@ -9639,34 +9969,6 @@
             </a:endParaRPr>
           </a:p>
           <a:p>
-            <a:pPr indent="-317500" lvl="0" marL="457200" rtl="0" algn="l">
-              <a:spcBef>
-                <a:spcPts val="0"/>
-              </a:spcBef>
-              <a:spcAft>
-                <a:spcPts val="0"/>
-              </a:spcAft>
-              <a:buClr>
-                <a:srgbClr val="000000"/>
-              </a:buClr>
-              <a:buSzPts val="1400"/>
-              <a:buChar char="●"/>
-            </a:pPr>
-            <a:r>
-              <a:rPr lang="en-GB" sz="1400">
-                <a:solidFill>
-                  <a:srgbClr val="000000"/>
-                </a:solidFill>
-              </a:rPr>
-              <a:t>To evaluate the model's performance, we calculated the balanced accuracy score, generated a confusion matrix, and printed the classification report. The results showed that the model had a balanced accuracy score of 0.71 and an F1 score of 0.74.</a:t>
-            </a:r>
-            <a:endParaRPr sz="1400">
-              <a:solidFill>
-                <a:srgbClr val="000000"/>
-              </a:solidFill>
-            </a:endParaRPr>
-          </a:p>
-          <a:p>
             <a:pPr indent="0" lvl="0" marL="0" rtl="0" algn="l">
               <a:spcBef>
                 <a:spcPts val="1200"/>
@@ -9708,7 +10010,7 @@
       </p:sp>
       <p:pic>
         <p:nvPicPr>
-          <p:cNvPr id="156" name="Google Shape;156;p27"/>
+          <p:cNvPr id="172" name="Google Shape;172;p27"/>
           <p:cNvPicPr preferRelativeResize="0"/>
           <p:nvPr/>
         </p:nvPicPr>
@@ -9722,8 +10024,8 @@
         </p:blipFill>
         <p:spPr>
           <a:xfrm>
-            <a:off x="144450" y="3675488"/>
-            <a:ext cx="8855100" cy="1554912"/>
+            <a:off x="155400" y="2178501"/>
+            <a:ext cx="8855100" cy="1686000"/>
           </a:xfrm>
           <a:prstGeom prst="rect">
             <a:avLst/>
@@ -9734,6 +10036,103 @@
           </a:ln>
         </p:spPr>
       </p:pic>
+      <p:sp>
+        <p:nvSpPr>
+          <p:cNvPr id="173" name="Google Shape;173;p27"/>
+          <p:cNvSpPr txBox="1"/>
+          <p:nvPr/>
+        </p:nvSpPr>
+        <p:spPr>
+          <a:xfrm>
+            <a:off x="5694000" y="217500"/>
+            <a:ext cx="3000000" cy="369300"/>
+          </a:xfrm>
+          <a:prstGeom prst="rect">
+            <a:avLst/>
+          </a:prstGeom>
+          <a:noFill/>
+          <a:ln>
+            <a:noFill/>
+          </a:ln>
+        </p:spPr>
+        <p:txBody>
+          <a:bodyPr anchorCtr="0" anchor="t" bIns="91425" lIns="91425" spcFirstLastPara="1" rIns="91425" wrap="square" tIns="91425">
+            <a:spAutoFit/>
+          </a:bodyPr>
+          <a:lstStyle/>
+          <a:p>
+            <a:pPr indent="0" lvl="0" marL="0" rtl="0" algn="l">
+              <a:spcBef>
+                <a:spcPts val="0"/>
+              </a:spcBef>
+              <a:spcAft>
+                <a:spcPts val="0"/>
+              </a:spcAft>
+              <a:buNone/>
+            </a:pPr>
+            <a:r>
+              <a:rPr lang="en-GB" sz="1200">
+                <a:solidFill>
+                  <a:schemeClr val="lt1"/>
+                </a:solidFill>
+                <a:latin typeface="Roboto"/>
+                <a:ea typeface="Roboto"/>
+                <a:cs typeface="Roboto"/>
+                <a:sym typeface="Roboto"/>
+              </a:rPr>
+              <a:t>Logistic Regression Model</a:t>
+            </a:r>
+            <a:endParaRPr sz="1200"/>
+          </a:p>
+        </p:txBody>
+      </p:sp>
+      <p:sp>
+        <p:nvSpPr>
+          <p:cNvPr id="174" name="Google Shape;174;p27"/>
+          <p:cNvSpPr/>
+          <p:nvPr/>
+        </p:nvSpPr>
+        <p:spPr>
+          <a:xfrm>
+            <a:off x="3122100" y="2943275"/>
+            <a:ext cx="563100" cy="294300"/>
+          </a:xfrm>
+          <a:prstGeom prst="rect">
+            <a:avLst/>
+          </a:prstGeom>
+          <a:noFill/>
+          <a:ln cap="flat" cmpd="sng" w="19050">
+            <a:solidFill>
+              <a:srgbClr val="FF0000"/>
+            </a:solidFill>
+            <a:prstDash val="solid"/>
+            <a:round/>
+            <a:headEnd len="sm" w="sm" type="none"/>
+            <a:tailEnd len="sm" w="sm" type="none"/>
+          </a:ln>
+        </p:spPr>
+        <p:txBody>
+          <a:bodyPr anchorCtr="0" anchor="ctr" bIns="91425" lIns="91425" spcFirstLastPara="1" rIns="91425" wrap="square" tIns="91425">
+            <a:noAutofit/>
+          </a:bodyPr>
+          <a:lstStyle/>
+          <a:p>
+            <a:pPr indent="0" lvl="0" marL="0" rtl="0" algn="l">
+              <a:spcBef>
+                <a:spcPts val="0"/>
+              </a:spcBef>
+              <a:spcAft>
+                <a:spcPts val="0"/>
+              </a:spcAft>
+              <a:buNone/>
+            </a:pPr>
+            <a:r>
+              <a:t/>
+            </a:r>
+            <a:endParaRPr/>
+          </a:p>
+        </p:txBody>
+      </p:sp>
     </p:spTree>
   </p:cSld>
   <p:clrMapOvr>
@@ -9747,7 +10146,7 @@
   <p:cSld>
     <p:spTree>
       <p:nvGrpSpPr>
-        <p:cNvPr id="160" name="Shape 160"/>
+        <p:cNvPr id="178" name="Shape 178"/>
         <p:cNvGrpSpPr/>
         <p:nvPr/>
       </p:nvGrpSpPr>
@@ -9761,7 +10160,7 @@
       </p:grpSpPr>
       <p:sp>
         <p:nvSpPr>
-          <p:cNvPr id="161" name="Google Shape;161;p28"/>
+          <p:cNvPr id="179" name="Google Shape;179;p28"/>
           <p:cNvSpPr txBox="1"/>
           <p:nvPr>
             <p:ph type="title"/>
@@ -9801,7 +10200,7 @@
       </p:sp>
       <p:sp>
         <p:nvSpPr>
-          <p:cNvPr id="162" name="Google Shape;162;p28"/>
+          <p:cNvPr id="180" name="Google Shape;180;p28"/>
           <p:cNvSpPr txBox="1"/>
           <p:nvPr>
             <p:ph idx="1" type="body"/>
@@ -10014,7 +10413,7 @@
   <p:cSld>
     <p:spTree>
       <p:nvGrpSpPr>
-        <p:cNvPr id="166" name="Shape 166"/>
+        <p:cNvPr id="184" name="Shape 184"/>
         <p:cNvGrpSpPr/>
         <p:nvPr/>
       </p:nvGrpSpPr>
@@ -10028,7 +10427,7 @@
       </p:grpSpPr>
       <p:sp>
         <p:nvSpPr>
-          <p:cNvPr id="167" name="Google Shape;167;p29"/>
+          <p:cNvPr id="185" name="Google Shape;185;p29"/>
           <p:cNvSpPr txBox="1"/>
           <p:nvPr>
             <p:ph type="title"/>
@@ -10068,7 +10467,7 @@
       </p:sp>
       <p:sp>
         <p:nvSpPr>
-          <p:cNvPr id="168" name="Google Shape;168;p29"/>
+          <p:cNvPr id="186" name="Google Shape;186;p29"/>
           <p:cNvSpPr txBox="1"/>
           <p:nvPr>
             <p:ph idx="1" type="body"/>
@@ -10213,7 +10612,7 @@
       </p:sp>
       <p:pic>
         <p:nvPicPr>
-          <p:cNvPr id="169" name="Google Shape;169;p29"/>
+          <p:cNvPr id="187" name="Google Shape;187;p29"/>
           <p:cNvPicPr preferRelativeResize="0"/>
           <p:nvPr/>
         </p:nvPicPr>
@@ -10252,7 +10651,7 @@
   <p:cSld>
     <p:spTree>
       <p:nvGrpSpPr>
-        <p:cNvPr id="173" name="Shape 173"/>
+        <p:cNvPr id="191" name="Shape 191"/>
         <p:cNvGrpSpPr/>
         <p:nvPr/>
       </p:nvGrpSpPr>
@@ -10266,7 +10665,7 @@
       </p:grpSpPr>
       <p:sp>
         <p:nvSpPr>
-          <p:cNvPr id="174" name="Google Shape;174;p30"/>
+          <p:cNvPr id="192" name="Google Shape;192;p30"/>
           <p:cNvSpPr txBox="1"/>
           <p:nvPr>
             <p:ph type="title"/>
@@ -10306,7 +10705,7 @@
       </p:sp>
       <p:sp>
         <p:nvSpPr>
-          <p:cNvPr id="175" name="Google Shape;175;p30"/>
+          <p:cNvPr id="193" name="Google Shape;193;p30"/>
           <p:cNvSpPr txBox="1"/>
           <p:nvPr>
             <p:ph idx="1" type="body"/>
@@ -10530,7 +10929,7 @@
   <p:cSld>
     <p:spTree>
       <p:nvGrpSpPr>
-        <p:cNvPr id="179" name="Shape 179"/>
+        <p:cNvPr id="197" name="Shape 197"/>
         <p:cNvGrpSpPr/>
         <p:nvPr/>
       </p:nvGrpSpPr>
@@ -10544,7 +10943,7 @@
       </p:grpSpPr>
       <p:sp>
         <p:nvSpPr>
-          <p:cNvPr id="180" name="Google Shape;180;p31"/>
+          <p:cNvPr id="198" name="Google Shape;198;p31"/>
           <p:cNvSpPr txBox="1"/>
           <p:nvPr>
             <p:ph type="title"/>
@@ -10584,7 +10983,7 @@
       </p:sp>
       <p:sp>
         <p:nvSpPr>
-          <p:cNvPr id="181" name="Google Shape;181;p31"/>
+          <p:cNvPr id="199" name="Google Shape;199;p31"/>
           <p:cNvSpPr txBox="1"/>
           <p:nvPr>
             <p:ph idx="1" type="body"/>
@@ -10927,7 +11326,7 @@
   <p:cSld>
     <p:spTree>
       <p:nvGrpSpPr>
-        <p:cNvPr id="185" name="Shape 185"/>
+        <p:cNvPr id="203" name="Shape 203"/>
         <p:cNvGrpSpPr/>
         <p:nvPr/>
       </p:nvGrpSpPr>
@@ -10941,7 +11340,7 @@
       </p:grpSpPr>
       <p:sp>
         <p:nvSpPr>
-          <p:cNvPr id="186" name="Google Shape;186;p32"/>
+          <p:cNvPr id="204" name="Google Shape;204;p32"/>
           <p:cNvSpPr txBox="1"/>
           <p:nvPr>
             <p:ph type="title"/>
@@ -10980,7 +11379,7 @@
       </p:sp>
       <p:sp>
         <p:nvSpPr>
-          <p:cNvPr id="187" name="Google Shape;187;p32"/>
+          <p:cNvPr id="205" name="Google Shape;205;p32"/>
           <p:cNvSpPr txBox="1"/>
           <p:nvPr>
             <p:ph idx="1" type="body"/>
@@ -11189,7 +11588,7 @@
                   <a:srgbClr val="FFFFFF"/>
                 </a:highlight>
               </a:rPr>
-              <a:t>Naive Bayes Classifier </a:t>
+              <a:t>Random Forest</a:t>
             </a:r>
             <a:endParaRPr sz="1700">
               <a:solidFill>
@@ -11223,41 +11622,7 @@
                   <a:srgbClr val="FFFFFF"/>
                 </a:highlight>
               </a:rPr>
-              <a:t>Tree-based algorithms</a:t>
-            </a:r>
-            <a:endParaRPr sz="1700">
-              <a:solidFill>
-                <a:srgbClr val="000000"/>
-              </a:solidFill>
-              <a:highlight>
-                <a:srgbClr val="FFFFFF"/>
-              </a:highlight>
-            </a:endParaRPr>
-          </a:p>
-          <a:p>
-            <a:pPr indent="-336550" lvl="1" marL="914400" rtl="0" algn="l">
-              <a:spcBef>
-                <a:spcPts val="0"/>
-              </a:spcBef>
-              <a:spcAft>
-                <a:spcPts val="0"/>
-              </a:spcAft>
-              <a:buClr>
-                <a:srgbClr val="000000"/>
-              </a:buClr>
-              <a:buSzPts val="1700"/>
-              <a:buChar char="○"/>
-            </a:pPr>
-            <a:r>
-              <a:rPr lang="en-GB" sz="1700">
-                <a:solidFill>
-                  <a:srgbClr val="000000"/>
-                </a:solidFill>
-                <a:highlight>
-                  <a:srgbClr val="FFFFFF"/>
-                </a:highlight>
-              </a:rPr>
-              <a:t>Random Forest</a:t>
+              <a:t>K-Nearest Neighbour</a:t>
             </a:r>
             <a:endParaRPr sz="1700">
               <a:solidFill>
@@ -11481,8 +11846,8 @@
         </p:nvSpPr>
         <p:spPr>
           <a:xfrm>
-            <a:off x="471900" y="1919075"/>
-            <a:ext cx="8222100" cy="2710200"/>
+            <a:off x="471900" y="1506425"/>
+            <a:ext cx="4479900" cy="2710200"/>
           </a:xfrm>
           <a:prstGeom prst="rect">
             <a:avLst/>
@@ -11494,23 +11859,17 @@
           </a:bodyPr>
           <a:lstStyle/>
           <a:p>
-            <a:pPr indent="-330200" lvl="0" marL="457200" rtl="0" algn="l">
-              <a:spcBef>
-                <a:spcPts val="0"/>
-              </a:spcBef>
-              <a:spcAft>
-                <a:spcPts val="0"/>
-              </a:spcAft>
-              <a:buSzPts val="1600"/>
-              <a:buChar char="●"/>
-            </a:pPr>
-            <a:r>
-              <a:rPr lang="en-GB" sz="1600">
-                <a:solidFill>
-                  <a:srgbClr val="000000"/>
-                </a:solidFill>
-              </a:rPr>
-              <a:t>This code reads in a CSV file called "Churn_Modelling.csv"</a:t>
+            <a:pPr indent="0" lvl="0" marL="0" rtl="0" algn="l">
+              <a:spcBef>
+                <a:spcPts val="0"/>
+              </a:spcBef>
+              <a:spcAft>
+                <a:spcPts val="0"/>
+              </a:spcAft>
+              <a:buNone/>
+            </a:pPr>
+            <a:r>
+              <a:t/>
             </a:r>
             <a:endParaRPr sz="1600">
               <a:solidFill>
@@ -11538,7 +11897,7 @@
                   <a:srgbClr val="000000"/>
                 </a:solidFill>
               </a:rPr>
-              <a:t>DataFrame has 10000 rows and 14 columns, as indicated by the output. Each row represents a customer and the columns contain various attributes or features of the customer, such as their credit score and estimated salary.</a:t>
+              <a:t>DataFrame contains 10,000 samples with 14 features</a:t>
             </a:r>
             <a:endParaRPr sz="1600">
               <a:solidFill>
@@ -11566,7 +11925,15 @@
                   <a:srgbClr val="000000"/>
                 </a:solidFill>
               </a:rPr>
-              <a:t>The code then uses the dtypes attribute to display the data type associated with each column. This is useful for identifying which columns contain categorical variables.</a:t>
+              <a:t>Features included</a:t>
+            </a:r>
+            <a:r>
+              <a:rPr lang="en-GB" sz="1600">
+                <a:solidFill>
+                  <a:srgbClr val="000000"/>
+                </a:solidFill>
+              </a:rPr>
+              <a:t>:</a:t>
             </a:r>
             <a:endParaRPr sz="1600">
               <a:solidFill>
@@ -11575,7 +11942,7 @@
             </a:endParaRPr>
           </a:p>
           <a:p>
-            <a:pPr indent="-330200" lvl="0" marL="457200" rtl="0" algn="l">
+            <a:pPr indent="-304800" lvl="1" marL="914400" rtl="0" algn="l">
               <a:spcBef>
                 <a:spcPts val="0"/>
               </a:spcBef>
@@ -11585,33 +11952,25 @@
               <a:buClr>
                 <a:srgbClr val="000000"/>
               </a:buClr>
-              <a:buSzPts val="1600"/>
-              <a:buChar char="●"/>
-            </a:pPr>
-            <a:r>
-              <a:rPr lang="en-GB" sz="1600">
+              <a:buSzPts val="1200"/>
+              <a:buChar char="○"/>
+            </a:pPr>
+            <a:r>
+              <a:rPr lang="en-GB" sz="1200">
                 <a:solidFill>
                   <a:srgbClr val="000000"/>
                 </a:solidFill>
               </a:rPr>
-              <a:t>C</a:t>
-            </a:r>
-            <a:r>
-              <a:rPr lang="en-GB" sz="1600">
-                <a:solidFill>
-                  <a:srgbClr val="000000"/>
-                </a:solidFill>
-              </a:rPr>
-              <a:t>ategorical variables identified:</a:t>
-            </a:r>
-            <a:endParaRPr sz="1600">
+              <a:t>Geography (categorical)</a:t>
+            </a:r>
+            <a:endParaRPr sz="1200">
               <a:solidFill>
                 <a:srgbClr val="000000"/>
               </a:solidFill>
             </a:endParaRPr>
           </a:p>
           <a:p>
-            <a:pPr indent="-330200" lvl="1" marL="914400" rtl="0" algn="l">
+            <a:pPr indent="-304800" lvl="1" marL="914400" rtl="0" algn="l">
               <a:spcBef>
                 <a:spcPts val="0"/>
               </a:spcBef>
@@ -11621,25 +11980,25 @@
               <a:buClr>
                 <a:srgbClr val="000000"/>
               </a:buClr>
-              <a:buSzPts val="1600"/>
+              <a:buSzPts val="1200"/>
               <a:buChar char="○"/>
             </a:pPr>
             <a:r>
-              <a:rPr lang="en-GB" sz="1600">
+              <a:rPr lang="en-GB" sz="1200">
                 <a:solidFill>
                   <a:srgbClr val="000000"/>
                 </a:solidFill>
               </a:rPr>
-              <a:t>Surname</a:t>
-            </a:r>
-            <a:endParaRPr sz="1600">
+              <a:t>Gender (categorical)</a:t>
+            </a:r>
+            <a:endParaRPr sz="1200">
               <a:solidFill>
                 <a:srgbClr val="000000"/>
               </a:solidFill>
             </a:endParaRPr>
           </a:p>
           <a:p>
-            <a:pPr indent="-330200" lvl="1" marL="914400" rtl="0" algn="l">
+            <a:pPr indent="-304800" lvl="1" marL="914400" rtl="0" algn="l">
               <a:spcBef>
                 <a:spcPts val="0"/>
               </a:spcBef>
@@ -11649,25 +12008,25 @@
               <a:buClr>
                 <a:srgbClr val="000000"/>
               </a:buClr>
-              <a:buSzPts val="1600"/>
+              <a:buSzPts val="1200"/>
               <a:buChar char="○"/>
             </a:pPr>
             <a:r>
-              <a:rPr lang="en-GB" sz="1600">
+              <a:rPr lang="en-GB" sz="1200">
                 <a:solidFill>
                   <a:srgbClr val="000000"/>
                 </a:solidFill>
               </a:rPr>
-              <a:t>Geography </a:t>
-            </a:r>
-            <a:endParaRPr sz="1600">
+              <a:t>Age </a:t>
+            </a:r>
+            <a:endParaRPr sz="1200">
               <a:solidFill>
                 <a:srgbClr val="000000"/>
               </a:solidFill>
             </a:endParaRPr>
           </a:p>
           <a:p>
-            <a:pPr indent="-330200" lvl="1" marL="914400" rtl="0" algn="l">
+            <a:pPr indent="-304800" lvl="1" marL="914400" rtl="0" algn="l">
               <a:spcBef>
                 <a:spcPts val="0"/>
               </a:spcBef>
@@ -11677,25 +12036,221 @@
               <a:buClr>
                 <a:srgbClr val="000000"/>
               </a:buClr>
-              <a:buSzPts val="1600"/>
+              <a:buSzPts val="1200"/>
               <a:buChar char="○"/>
             </a:pPr>
             <a:r>
-              <a:rPr lang="en-GB" sz="1600">
+              <a:rPr lang="en-GB" sz="1200">
                 <a:solidFill>
                   <a:srgbClr val="000000"/>
                 </a:solidFill>
               </a:rPr>
-              <a:t>Gender </a:t>
-            </a:r>
-            <a:endParaRPr sz="1600">
+              <a:t>Tenure </a:t>
+            </a:r>
+            <a:endParaRPr sz="1200">
               <a:solidFill>
                 <a:srgbClr val="000000"/>
               </a:solidFill>
             </a:endParaRPr>
           </a:p>
+          <a:p>
+            <a:pPr indent="-304800" lvl="1" marL="914400" rtl="0" algn="l">
+              <a:spcBef>
+                <a:spcPts val="0"/>
+              </a:spcBef>
+              <a:spcAft>
+                <a:spcPts val="0"/>
+              </a:spcAft>
+              <a:buClr>
+                <a:srgbClr val="000000"/>
+              </a:buClr>
+              <a:buSzPts val="1200"/>
+              <a:buChar char="○"/>
+            </a:pPr>
+            <a:r>
+              <a:rPr lang="en-GB" sz="1200">
+                <a:solidFill>
+                  <a:srgbClr val="000000"/>
+                </a:solidFill>
+              </a:rPr>
+              <a:t>Balance </a:t>
+            </a:r>
+            <a:endParaRPr sz="1200">
+              <a:solidFill>
+                <a:srgbClr val="000000"/>
+              </a:solidFill>
+            </a:endParaRPr>
+          </a:p>
+          <a:p>
+            <a:pPr indent="-304800" lvl="1" marL="914400" rtl="0" algn="l">
+              <a:spcBef>
+                <a:spcPts val="0"/>
+              </a:spcBef>
+              <a:spcAft>
+                <a:spcPts val="0"/>
+              </a:spcAft>
+              <a:buClr>
+                <a:srgbClr val="000000"/>
+              </a:buClr>
+              <a:buSzPts val="1200"/>
+              <a:buChar char="○"/>
+            </a:pPr>
+            <a:r>
+              <a:rPr lang="en-GB" sz="1200">
+                <a:solidFill>
+                  <a:srgbClr val="000000"/>
+                </a:solidFill>
+              </a:rPr>
+              <a:t>Number of products </a:t>
+            </a:r>
+            <a:endParaRPr sz="1200">
+              <a:solidFill>
+                <a:srgbClr val="000000"/>
+              </a:solidFill>
+            </a:endParaRPr>
+          </a:p>
+          <a:p>
+            <a:pPr indent="-304800" lvl="1" marL="914400" rtl="0" algn="l">
+              <a:spcBef>
+                <a:spcPts val="0"/>
+              </a:spcBef>
+              <a:spcAft>
+                <a:spcPts val="0"/>
+              </a:spcAft>
+              <a:buClr>
+                <a:srgbClr val="000000"/>
+              </a:buClr>
+              <a:buSzPts val="1200"/>
+              <a:buChar char="○"/>
+            </a:pPr>
+            <a:r>
+              <a:rPr lang="en-GB" sz="1200">
+                <a:solidFill>
+                  <a:srgbClr val="000000"/>
+                </a:solidFill>
+              </a:rPr>
+              <a:t>Credit card or not </a:t>
+            </a:r>
+            <a:endParaRPr sz="1200">
+              <a:solidFill>
+                <a:srgbClr val="000000"/>
+              </a:solidFill>
+            </a:endParaRPr>
+          </a:p>
+          <a:p>
+            <a:pPr indent="-304800" lvl="1" marL="914400" rtl="0" algn="l">
+              <a:spcBef>
+                <a:spcPts val="0"/>
+              </a:spcBef>
+              <a:spcAft>
+                <a:spcPts val="0"/>
+              </a:spcAft>
+              <a:buClr>
+                <a:srgbClr val="000000"/>
+              </a:buClr>
+              <a:buSzPts val="1200"/>
+              <a:buChar char="○"/>
+            </a:pPr>
+            <a:r>
+              <a:rPr lang="en-GB" sz="1200">
+                <a:solidFill>
+                  <a:srgbClr val="000000"/>
+                </a:solidFill>
+              </a:rPr>
+              <a:t>Active or not </a:t>
+            </a:r>
+            <a:endParaRPr sz="1200">
+              <a:solidFill>
+                <a:srgbClr val="000000"/>
+              </a:solidFill>
+            </a:endParaRPr>
+          </a:p>
+          <a:p>
+            <a:pPr indent="-304800" lvl="1" marL="914400" rtl="0" algn="l">
+              <a:spcBef>
+                <a:spcPts val="0"/>
+              </a:spcBef>
+              <a:spcAft>
+                <a:spcPts val="0"/>
+              </a:spcAft>
+              <a:buClr>
+                <a:srgbClr val="000000"/>
+              </a:buClr>
+              <a:buSzPts val="1200"/>
+              <a:buChar char="○"/>
+            </a:pPr>
+            <a:r>
+              <a:rPr lang="en-GB" sz="1200">
+                <a:solidFill>
+                  <a:srgbClr val="000000"/>
+                </a:solidFill>
+              </a:rPr>
+              <a:t>Estimated Salary </a:t>
+            </a:r>
+            <a:endParaRPr sz="1200">
+              <a:solidFill>
+                <a:srgbClr val="000000"/>
+              </a:solidFill>
+            </a:endParaRPr>
+          </a:p>
+          <a:p>
+            <a:pPr indent="-304800" lvl="1" marL="914400" rtl="0" algn="l">
+              <a:spcBef>
+                <a:spcPts val="0"/>
+              </a:spcBef>
+              <a:spcAft>
+                <a:spcPts val="0"/>
+              </a:spcAft>
+              <a:buClr>
+                <a:srgbClr val="000000"/>
+              </a:buClr>
+              <a:buSzPts val="1200"/>
+              <a:buChar char="○"/>
+            </a:pPr>
+            <a:r>
+              <a:rPr lang="en-GB" sz="1200">
+                <a:solidFill>
+                  <a:srgbClr val="000000"/>
+                </a:solidFill>
+              </a:rPr>
+              <a:t>Credit score </a:t>
+            </a:r>
+            <a:endParaRPr sz="1200">
+              <a:solidFill>
+                <a:srgbClr val="000000"/>
+              </a:solidFill>
+            </a:endParaRPr>
+          </a:p>
         </p:txBody>
       </p:sp>
+      <p:pic>
+        <p:nvPicPr>
+          <p:cNvPr id="87" name="Google Shape;87;p16"/>
+          <p:cNvPicPr preferRelativeResize="0"/>
+          <p:nvPr/>
+        </p:nvPicPr>
+        <p:blipFill>
+          <a:blip r:embed="rId3">
+            <a:alphaModFix/>
+          </a:blip>
+          <a:stretch>
+            <a:fillRect/>
+          </a:stretch>
+        </p:blipFill>
+        <p:spPr>
+          <a:xfrm>
+            <a:off x="5157800" y="1963549"/>
+            <a:ext cx="3612025" cy="2870775"/>
+          </a:xfrm>
+          <a:prstGeom prst="rect">
+            <a:avLst/>
+          </a:prstGeom>
+          <a:noFill/>
+          <a:ln>
+            <a:noFill/>
+          </a:ln>
+        </p:spPr>
+      </p:pic>
     </p:spTree>
   </p:cSld>
   <p:clrMapOvr>
@@ -11709,7 +12264,7 @@
   <p:cSld>
     <p:spTree>
       <p:nvGrpSpPr>
-        <p:cNvPr id="90" name="Shape 90"/>
+        <p:cNvPr id="91" name="Shape 91"/>
         <p:cNvGrpSpPr/>
         <p:nvPr/>
       </p:nvGrpSpPr>
@@ -11723,7 +12278,7 @@
       </p:grpSpPr>
       <p:sp>
         <p:nvSpPr>
-          <p:cNvPr id="91" name="Google Shape;91;p17"/>
+          <p:cNvPr id="92" name="Google Shape;92;p17"/>
           <p:cNvSpPr txBox="1"/>
           <p:nvPr>
             <p:ph type="title"/>
@@ -11755,7 +12310,7 @@
             </a:pPr>
             <a:r>
               <a:rPr lang="en-GB"/>
-              <a:t>Our Data </a:t>
+              <a:t>Data preparation</a:t>
             </a:r>
             <a:endParaRPr/>
           </a:p>
@@ -11763,7 +12318,7 @@
       </p:sp>
       <p:sp>
         <p:nvSpPr>
-          <p:cNvPr id="92" name="Google Shape;92;p17"/>
+          <p:cNvPr id="93" name="Google Shape;93;p17"/>
           <p:cNvSpPr txBox="1"/>
           <p:nvPr>
             <p:ph idx="1" type="body"/>
@@ -11803,15 +12358,7 @@
                   <a:srgbClr val="000000"/>
                 </a:solidFill>
               </a:rPr>
-              <a:t>We then </a:t>
-            </a:r>
-            <a:r>
-              <a:rPr lang="en-GB">
-                <a:solidFill>
-                  <a:srgbClr val="000000"/>
-                </a:solidFill>
-              </a:rPr>
-              <a:t>perform one-hot encoding on the categorical variables </a:t>
+              <a:t>Data cleaning: checking null value use function of “isnull”</a:t>
             </a:r>
             <a:endParaRPr>
               <a:solidFill>
@@ -11839,7 +12386,7 @@
                   <a:srgbClr val="000000"/>
                 </a:solidFill>
               </a:rPr>
-              <a:t>One-hot encoding represents categorical variables as numerical data that is suitable for machine learning algorithms by creating a binary column for each unique category.</a:t>
+              <a:t>Combine both encoded features with original dataset as new dataframe called “attribtion_df”</a:t>
             </a:r>
             <a:endParaRPr>
               <a:solidFill>
@@ -11867,23 +12414,7 @@
                   <a:srgbClr val="000000"/>
                 </a:solidFill>
               </a:rPr>
-              <a:t>two new variables are defined: y, which is the target variable (the "Exited" column), and X, which is the feature set (all the columns in attrition_df except for "</a:t>
-            </a:r>
-            <a:r>
-              <a:rPr lang="en-GB">
-                <a:solidFill>
-                  <a:srgbClr val="000000"/>
-                </a:solidFill>
-              </a:rPr>
-              <a:t>Exited</a:t>
-            </a:r>
-            <a:r>
-              <a:rPr lang="en-GB">
-                <a:solidFill>
-                  <a:srgbClr val="000000"/>
-                </a:solidFill>
-              </a:rPr>
-              <a:t>").</a:t>
+              <a:t>Set out column “Existed” as target column, and the rest being X features</a:t>
             </a:r>
             <a:endParaRPr>
               <a:solidFill>
@@ -11893,6 +12424,34 @@
           </a:p>
         </p:txBody>
       </p:sp>
+      <p:pic>
+        <p:nvPicPr>
+          <p:cNvPr id="94" name="Google Shape;94;p17"/>
+          <p:cNvPicPr preferRelativeResize="0"/>
+          <p:nvPr/>
+        </p:nvPicPr>
+        <p:blipFill>
+          <a:blip r:embed="rId3">
+            <a:alphaModFix/>
+          </a:blip>
+          <a:stretch>
+            <a:fillRect/>
+          </a:stretch>
+        </p:blipFill>
+        <p:spPr>
+          <a:xfrm>
+            <a:off x="678400" y="3335825"/>
+            <a:ext cx="7429500" cy="1447800"/>
+          </a:xfrm>
+          <a:prstGeom prst="rect">
+            <a:avLst/>
+          </a:prstGeom>
+          <a:noFill/>
+          <a:ln>
+            <a:noFill/>
+          </a:ln>
+        </p:spPr>
+      </p:pic>
     </p:spTree>
   </p:cSld>
   <p:clrMapOvr>
@@ -11906,7 +12465,7 @@
   <p:cSld>
     <p:spTree>
       <p:nvGrpSpPr>
-        <p:cNvPr id="96" name="Shape 96"/>
+        <p:cNvPr id="98" name="Shape 98"/>
         <p:cNvGrpSpPr/>
         <p:nvPr/>
       </p:nvGrpSpPr>
@@ -11920,7 +12479,7 @@
       </p:grpSpPr>
       <p:sp>
         <p:nvSpPr>
-          <p:cNvPr id="97" name="Google Shape;97;p18"/>
+          <p:cNvPr id="99" name="Google Shape;99;p18"/>
           <p:cNvSpPr txBox="1"/>
           <p:nvPr>
             <p:ph type="title"/>
@@ -11952,7 +12511,7 @@
             </a:pPr>
             <a:r>
               <a:rPr lang="en-GB"/>
-              <a:t>Training and Testing Sets </a:t>
+              <a:t>Training, Validation and Testing Sets </a:t>
             </a:r>
             <a:endParaRPr/>
           </a:p>
@@ -11960,7 +12519,7 @@
       </p:sp>
       <p:sp>
         <p:nvSpPr>
-          <p:cNvPr id="98" name="Google Shape;98;p18"/>
+          <p:cNvPr id="100" name="Google Shape;100;p18"/>
           <p:cNvSpPr txBox="1"/>
           <p:nvPr>
             <p:ph idx="1" type="body"/>
@@ -11981,26 +12540,42 @@
           </a:bodyPr>
           <a:lstStyle/>
           <a:p>
-            <a:pPr indent="-330200" lvl="0" marL="457200" rtl="0" algn="l">
-              <a:spcBef>
-                <a:spcPts val="0"/>
-              </a:spcBef>
-              <a:spcAft>
-                <a:spcPts val="0"/>
-              </a:spcAft>
-              <a:buClr>
-                <a:srgbClr val="000000"/>
-              </a:buClr>
-              <a:buSzPts val="1600"/>
-              <a:buChar char="●"/>
-            </a:pPr>
-            <a:r>
-              <a:rPr lang="en-GB" sz="1600">
+            <a:pPr indent="0" lvl="0" marL="0" rtl="0" algn="l">
+              <a:spcBef>
+                <a:spcPts val="0"/>
+              </a:spcBef>
+              <a:spcAft>
+                <a:spcPts val="0"/>
+              </a:spcAft>
+              <a:buNone/>
+            </a:pPr>
+            <a:r>
+              <a:rPr lang="en-GB" sz="1200">
                 <a:solidFill>
                   <a:srgbClr val="000000"/>
                 </a:solidFill>
               </a:rPr>
-              <a:t>In this step of the project, we prepared the data for machine learning by splitting it into training and testing sets, and standardizing the features. </a:t>
+              <a:t>Using the function </a:t>
+            </a:r>
+            <a:r>
+              <a:rPr lang="en-GB" sz="950">
+                <a:solidFill>
+                  <a:srgbClr val="000000"/>
+                </a:solidFill>
+                <a:latin typeface="Arial"/>
+                <a:ea typeface="Arial"/>
+                <a:cs typeface="Arial"/>
+                <a:sym typeface="Arial"/>
+              </a:rPr>
+              <a:t>train_test_split</a:t>
+            </a:r>
+            <a:r>
+              <a:rPr lang="en-GB" sz="1200">
+                <a:solidFill>
+                  <a:srgbClr val="000000"/>
+                </a:solidFill>
+              </a:rPr>
+              <a:t> from the scikit-learn library in Python. This function is used to split a given dataset into two subsets: a training set and a test set.</a:t>
             </a:r>
             <a:endParaRPr sz="1600">
               <a:solidFill>
@@ -12009,62 +12584,6 @@
             </a:endParaRPr>
           </a:p>
           <a:p>
-            <a:pPr indent="-330200" lvl="0" marL="457200" rtl="0" algn="l">
-              <a:spcBef>
-                <a:spcPts val="0"/>
-              </a:spcBef>
-              <a:spcAft>
-                <a:spcPts val="0"/>
-              </a:spcAft>
-              <a:buClr>
-                <a:srgbClr val="000000"/>
-              </a:buClr>
-              <a:buSzPts val="1600"/>
-              <a:buChar char="●"/>
-            </a:pPr>
-            <a:r>
-              <a:rPr lang="en-GB" sz="1600">
-                <a:solidFill>
-                  <a:srgbClr val="000000"/>
-                </a:solidFill>
-              </a:rPr>
-              <a:t>We used the train_test_split function to split the feature set (X) and the target variable (y) into training and testing datasets. We also used the StandardScaler class to standardize the features. </a:t>
-            </a:r>
-            <a:endParaRPr sz="1600">
-              <a:solidFill>
-                <a:srgbClr val="000000"/>
-              </a:solidFill>
-            </a:endParaRPr>
-          </a:p>
-          <a:p>
-            <a:pPr indent="-330200" lvl="0" marL="457200" rtl="0" algn="l">
-              <a:spcBef>
-                <a:spcPts val="0"/>
-              </a:spcBef>
-              <a:spcAft>
-                <a:spcPts val="0"/>
-              </a:spcAft>
-              <a:buClr>
-                <a:srgbClr val="000000"/>
-              </a:buClr>
-              <a:buSzPts val="1600"/>
-              <a:buChar char="●"/>
-            </a:pPr>
-            <a:r>
-              <a:rPr lang="en-GB" sz="1600">
-                <a:solidFill>
-                  <a:srgbClr val="000000"/>
-                </a:solidFill>
-              </a:rPr>
-              <a:t>Standardization scales the data so that it has a mean of 0 and a standard deviation of 1. We stored the resulting datasets in variables called X_train_scaled, X_test_scaled, y_train, and y_test. These datasets will be used to train and test a machine learning model in the next steps.</a:t>
-            </a:r>
-            <a:endParaRPr sz="1600">
-              <a:solidFill>
-                <a:srgbClr val="000000"/>
-              </a:solidFill>
-            </a:endParaRPr>
-          </a:p>
-          <a:p>
             <a:pPr indent="0" lvl="0" marL="0" rtl="0" algn="l">
               <a:spcBef>
                 <a:spcPts val="0"/>
@@ -12083,8 +12602,188 @@
               </a:solidFill>
             </a:endParaRPr>
           </a:p>
+          <a:p>
+            <a:pPr indent="0" lvl="0" marL="0" rtl="0" algn="l">
+              <a:spcBef>
+                <a:spcPts val="0"/>
+              </a:spcBef>
+              <a:spcAft>
+                <a:spcPts val="0"/>
+              </a:spcAft>
+              <a:buNone/>
+            </a:pPr>
+            <a:r>
+              <a:rPr lang="en-GB" sz="1200">
+                <a:solidFill>
+                  <a:srgbClr val="000000"/>
+                </a:solidFill>
+              </a:rPr>
+              <a:t>Step 1:</a:t>
+            </a:r>
+            <a:endParaRPr sz="1200">
+              <a:solidFill>
+                <a:srgbClr val="000000"/>
+              </a:solidFill>
+            </a:endParaRPr>
+          </a:p>
+          <a:p>
+            <a:pPr indent="0" lvl="0" marL="0" rtl="0" algn="l">
+              <a:spcBef>
+                <a:spcPts val="0"/>
+              </a:spcBef>
+              <a:spcAft>
+                <a:spcPts val="0"/>
+              </a:spcAft>
+              <a:buNone/>
+            </a:pPr>
+            <a:r>
+              <a:t/>
+            </a:r>
+            <a:endParaRPr sz="1200">
+              <a:solidFill>
+                <a:srgbClr val="000000"/>
+              </a:solidFill>
+            </a:endParaRPr>
+          </a:p>
+          <a:p>
+            <a:pPr indent="0" lvl="0" marL="0" rtl="0" algn="l">
+              <a:spcBef>
+                <a:spcPts val="0"/>
+              </a:spcBef>
+              <a:spcAft>
+                <a:spcPts val="0"/>
+              </a:spcAft>
+              <a:buNone/>
+            </a:pPr>
+            <a:r>
+              <a:t/>
+            </a:r>
+            <a:endParaRPr sz="1200">
+              <a:solidFill>
+                <a:srgbClr val="000000"/>
+              </a:solidFill>
+            </a:endParaRPr>
+          </a:p>
+          <a:p>
+            <a:pPr indent="0" lvl="0" marL="0" rtl="0" algn="l">
+              <a:spcBef>
+                <a:spcPts val="0"/>
+              </a:spcBef>
+              <a:spcAft>
+                <a:spcPts val="0"/>
+              </a:spcAft>
+              <a:buNone/>
+            </a:pPr>
+            <a:r>
+              <a:t/>
+            </a:r>
+            <a:endParaRPr sz="1200">
+              <a:solidFill>
+                <a:srgbClr val="000000"/>
+              </a:solidFill>
+            </a:endParaRPr>
+          </a:p>
+          <a:p>
+            <a:pPr indent="0" lvl="0" marL="0" rtl="0" algn="l">
+              <a:spcBef>
+                <a:spcPts val="0"/>
+              </a:spcBef>
+              <a:spcAft>
+                <a:spcPts val="0"/>
+              </a:spcAft>
+              <a:buNone/>
+            </a:pPr>
+            <a:r>
+              <a:rPr lang="en-GB" sz="1200">
+                <a:solidFill>
+                  <a:srgbClr val="000000"/>
+                </a:solidFill>
+              </a:rPr>
+              <a:t>Step 2: </a:t>
+            </a:r>
+            <a:endParaRPr sz="1200">
+              <a:solidFill>
+                <a:srgbClr val="000000"/>
+              </a:solidFill>
+            </a:endParaRPr>
+          </a:p>
+          <a:p>
+            <a:pPr indent="0" lvl="0" marL="0" rtl="0" algn="l">
+              <a:spcBef>
+                <a:spcPts val="0"/>
+              </a:spcBef>
+              <a:spcAft>
+                <a:spcPts val="0"/>
+              </a:spcAft>
+              <a:buNone/>
+            </a:pPr>
+            <a:r>
+              <a:t/>
+            </a:r>
+            <a:endParaRPr sz="1200">
+              <a:solidFill>
+                <a:srgbClr val="000000"/>
+              </a:solidFill>
+            </a:endParaRPr>
+          </a:p>
         </p:txBody>
       </p:sp>
+      <p:pic>
+        <p:nvPicPr>
+          <p:cNvPr id="101" name="Google Shape;101;p18"/>
+          <p:cNvPicPr preferRelativeResize="0"/>
+          <p:nvPr/>
+        </p:nvPicPr>
+        <p:blipFill>
+          <a:blip r:embed="rId3">
+            <a:alphaModFix/>
+          </a:blip>
+          <a:stretch>
+            <a:fillRect/>
+          </a:stretch>
+        </p:blipFill>
+        <p:spPr>
+          <a:xfrm>
+            <a:off x="1139600" y="2784950"/>
+            <a:ext cx="5538461" cy="433925"/>
+          </a:xfrm>
+          <a:prstGeom prst="rect">
+            <a:avLst/>
+          </a:prstGeom>
+          <a:noFill/>
+          <a:ln>
+            <a:noFill/>
+          </a:ln>
+        </p:spPr>
+      </p:pic>
+      <p:pic>
+        <p:nvPicPr>
+          <p:cNvPr id="102" name="Google Shape;102;p18"/>
+          <p:cNvPicPr preferRelativeResize="0"/>
+          <p:nvPr/>
+        </p:nvPicPr>
+        <p:blipFill>
+          <a:blip r:embed="rId4">
+            <a:alphaModFix/>
+          </a:blip>
+          <a:stretch>
+            <a:fillRect/>
+          </a:stretch>
+        </p:blipFill>
+        <p:spPr>
+          <a:xfrm>
+            <a:off x="1093050" y="3769275"/>
+            <a:ext cx="7133699" cy="911825"/>
+          </a:xfrm>
+          <a:prstGeom prst="rect">
+            <a:avLst/>
+          </a:prstGeom>
+          <a:noFill/>
+          <a:ln>
+            <a:noFill/>
+          </a:ln>
+        </p:spPr>
+      </p:pic>
     </p:spTree>
   </p:cSld>
   <p:clrMapOvr>
@@ -12098,7 +12797,7 @@
   <p:cSld>
     <p:spTree>
       <p:nvGrpSpPr>
-        <p:cNvPr id="102" name="Shape 102"/>
+        <p:cNvPr id="106" name="Shape 106"/>
         <p:cNvGrpSpPr/>
         <p:nvPr/>
       </p:nvGrpSpPr>
@@ -12112,7 +12811,7 @@
       </p:grpSpPr>
       <p:sp>
         <p:nvSpPr>
-          <p:cNvPr id="103" name="Google Shape;103;p19"/>
+          <p:cNvPr id="107" name="Google Shape;107;p19"/>
           <p:cNvSpPr txBox="1"/>
           <p:nvPr>
             <p:ph type="title"/>
@@ -12120,7 +12819,7 @@
         </p:nvSpPr>
         <p:spPr>
           <a:xfrm>
-            <a:off x="471900" y="738725"/>
+            <a:off x="460950" y="751525"/>
             <a:ext cx="8222100" cy="767700"/>
           </a:xfrm>
           <a:prstGeom prst="rect">
@@ -12144,15 +12843,11 @@
             </a:pPr>
             <a:r>
               <a:rPr lang="en-GB"/>
-              <a:t>Creating a Deep Neural Network </a:t>
+              <a:t>Model</a:t>
             </a:r>
             <a:r>
               <a:rPr lang="en-GB"/>
-              <a:t>Model</a:t>
-            </a:r>
-            <a:r>
-              <a:rPr lang="en-GB"/>
-              <a:t> </a:t>
+              <a:t> Structure</a:t>
             </a:r>
             <a:endParaRPr/>
           </a:p>
@@ -12160,7 +12855,7 @@
       </p:sp>
       <p:sp>
         <p:nvSpPr>
-          <p:cNvPr id="104" name="Google Shape;104;p19"/>
+          <p:cNvPr id="108" name="Google Shape;108;p19"/>
           <p:cNvSpPr txBox="1"/>
           <p:nvPr>
             <p:ph idx="1" type="body"/>
@@ -12424,7 +13119,7 @@
       </p:sp>
       <p:pic>
         <p:nvPicPr>
-          <p:cNvPr id="105" name="Google Shape;105;p19"/>
+          <p:cNvPr id="109" name="Google Shape;109;p19"/>
           <p:cNvPicPr preferRelativeResize="0"/>
           <p:nvPr/>
         </p:nvPicPr>
@@ -12438,8 +13133,8 @@
         </p:blipFill>
         <p:spPr>
           <a:xfrm>
-            <a:off x="5518625" y="2931025"/>
-            <a:ext cx="3625375" cy="2212475"/>
+            <a:off x="5489875" y="2159700"/>
+            <a:ext cx="3554924" cy="1789125"/>
           </a:xfrm>
           <a:prstGeom prst="rect">
             <a:avLst/>
@@ -12450,6 +13145,56 @@
           </a:ln>
         </p:spPr>
       </p:pic>
+      <p:sp>
+        <p:nvSpPr>
+          <p:cNvPr id="110" name="Google Shape;110;p19"/>
+          <p:cNvSpPr txBox="1"/>
+          <p:nvPr/>
+        </p:nvSpPr>
+        <p:spPr>
+          <a:xfrm>
+            <a:off x="7332525" y="121625"/>
+            <a:ext cx="1511100" cy="384900"/>
+          </a:xfrm>
+          <a:prstGeom prst="rect">
+            <a:avLst/>
+          </a:prstGeom>
+          <a:noFill/>
+          <a:ln>
+            <a:noFill/>
+          </a:ln>
+        </p:spPr>
+        <p:txBody>
+          <a:bodyPr anchorCtr="0" anchor="t" bIns="91425" lIns="91425" spcFirstLastPara="1" rIns="91425" wrap="square" tIns="91425">
+            <a:spAutoFit/>
+          </a:bodyPr>
+          <a:lstStyle/>
+          <a:p>
+            <a:pPr indent="0" lvl="0" marL="0" rtl="0" algn="l">
+              <a:spcBef>
+                <a:spcPts val="0"/>
+              </a:spcBef>
+              <a:spcAft>
+                <a:spcPts val="0"/>
+              </a:spcAft>
+              <a:buNone/>
+            </a:pPr>
+            <a:r>
+              <a:rPr b="1" lang="en-GB" sz="1300" u="sng">
+                <a:solidFill>
+                  <a:schemeClr val="lt1"/>
+                </a:solidFill>
+                <a:latin typeface="Roboto"/>
+                <a:ea typeface="Roboto"/>
+                <a:cs typeface="Roboto"/>
+                <a:sym typeface="Roboto"/>
+              </a:rPr>
+              <a:t>Neural Network</a:t>
+            </a:r>
+            <a:endParaRPr b="1" sz="1300" u="sng"/>
+          </a:p>
+        </p:txBody>
+      </p:sp>
     </p:spTree>
   </p:cSld>
   <p:clrMapOvr>
@@ -12463,7 +13208,7 @@
   <p:cSld>
     <p:spTree>
       <p:nvGrpSpPr>
-        <p:cNvPr id="109" name="Shape 109"/>
+        <p:cNvPr id="114" name="Shape 114"/>
         <p:cNvGrpSpPr/>
         <p:nvPr/>
       </p:nvGrpSpPr>
@@ -12477,7 +13222,7 @@
       </p:grpSpPr>
       <p:sp>
         <p:nvSpPr>
-          <p:cNvPr id="110" name="Google Shape;110;p20"/>
+          <p:cNvPr id="115" name="Google Shape;115;p20"/>
           <p:cNvSpPr txBox="1"/>
           <p:nvPr>
             <p:ph type="title"/>
@@ -12509,7 +13254,7 @@
             </a:pPr>
             <a:r>
               <a:rPr lang="en-GB"/>
-              <a:t>Compiling the Modal </a:t>
+              <a:t>Compiling the Model </a:t>
             </a:r>
             <a:endParaRPr/>
           </a:p>
@@ -12517,7 +13262,7 @@
       </p:sp>
       <p:sp>
         <p:nvSpPr>
-          <p:cNvPr id="111" name="Google Shape;111;p20"/>
+          <p:cNvPr id="116" name="Google Shape;116;p20"/>
           <p:cNvSpPr txBox="1"/>
           <p:nvPr>
             <p:ph idx="1" type="body"/>
@@ -12526,7 +13271,7 @@
         <p:spPr>
           <a:xfrm>
             <a:off x="471900" y="1919075"/>
-            <a:ext cx="8222100" cy="2710200"/>
+            <a:ext cx="3226500" cy="2816700"/>
           </a:xfrm>
           <a:prstGeom prst="rect">
             <a:avLst/>
@@ -12534,7 +13279,7 @@
         </p:spPr>
         <p:txBody>
           <a:bodyPr anchorCtr="0" anchor="t" bIns="91425" lIns="91425" spcFirstLastPara="1" rIns="91425" wrap="square" tIns="91425">
-            <a:normAutofit lnSpcReduction="20000"/>
+            <a:normAutofit fontScale="85000" lnSpcReduction="20000"/>
           </a:bodyPr>
           <a:lstStyle/>
           <a:p>
@@ -12553,7 +13298,23 @@
                   <a:srgbClr val="000000"/>
                 </a:solidFill>
               </a:rPr>
-              <a:t>We compile the Sequential model using the compile method and specify the binary_crossentropy loss function, the adam optimizer, and the accuracy metric.</a:t>
+              <a:t>We compile the Sequential model using loss function of ‘</a:t>
+            </a:r>
+            <a:r>
+              <a:rPr lang="en-GB" sz="1600">
+                <a:solidFill>
+                  <a:srgbClr val="000000"/>
+                </a:solidFill>
+              </a:rPr>
+              <a:t>binary_crossentropy’</a:t>
+            </a:r>
+            <a:r>
+              <a:rPr lang="en-GB" sz="1600">
+                <a:solidFill>
+                  <a:srgbClr val="000000"/>
+                </a:solidFill>
+              </a:rPr>
+              <a:t>, the ‘adam’ optimizer, and the various metric.</a:t>
             </a:r>
             <a:endParaRPr sz="1600">
               <a:solidFill>
@@ -12562,7 +13323,7 @@
             </a:endParaRPr>
           </a:p>
           <a:p>
-            <a:pPr indent="-330200" lvl="0" marL="457200" rtl="0" algn="l">
+            <a:pPr indent="-314960" lvl="0" marL="457200" rtl="0" algn="l">
               <a:spcBef>
                 <a:spcPts val="0"/>
               </a:spcBef>
@@ -12572,7 +13333,7 @@
               <a:buClr>
                 <a:srgbClr val="000000"/>
               </a:buClr>
-              <a:buSzPts val="1600"/>
+              <a:buSzPct val="100000"/>
               <a:buChar char="●"/>
             </a:pPr>
             <a:r>
@@ -12581,7 +13342,23 @@
                   <a:srgbClr val="000000"/>
                 </a:solidFill>
               </a:rPr>
-              <a:t>The loss function is used to measure how well the model is able to predict the target variable. In this case, the binary_crossentropy loss function is used because the target variable is a binary value (0 or 1). </a:t>
+              <a:t>The loss function </a:t>
+            </a:r>
+            <a:r>
+              <a:rPr lang="en-GB" sz="1600">
+                <a:solidFill>
+                  <a:srgbClr val="000000"/>
+                </a:solidFill>
+              </a:rPr>
+              <a:t>of ‘binary_crossentropy’</a:t>
+            </a:r>
+            <a:r>
+              <a:rPr lang="en-GB" sz="1600">
+                <a:solidFill>
+                  <a:srgbClr val="000000"/>
+                </a:solidFill>
+              </a:rPr>
+              <a:t> is used for binary classification problem;</a:t>
             </a:r>
             <a:endParaRPr sz="1600">
               <a:solidFill>
@@ -12590,7 +13367,7 @@
             </a:endParaRPr>
           </a:p>
           <a:p>
-            <a:pPr indent="-330200" lvl="0" marL="457200" rtl="0" algn="l">
+            <a:pPr indent="-314960" lvl="0" marL="457200" rtl="0" algn="l">
               <a:spcBef>
                 <a:spcPts val="0"/>
               </a:spcBef>
@@ -12600,7 +13377,7 @@
               <a:buClr>
                 <a:srgbClr val="000000"/>
               </a:buClr>
-              <a:buSzPts val="1600"/>
+              <a:buSzPct val="100000"/>
               <a:buChar char="●"/>
             </a:pPr>
             <a:r>
@@ -12609,7 +13386,7 @@
                   <a:srgbClr val="000000"/>
                 </a:solidFill>
               </a:rPr>
-              <a:t>The optimizer is used to adjust the model's weights and biases to minimize the loss function. In this case, the Adam optimizer is used. The metrics are used to evaluate the model's performance. </a:t>
+              <a:t>‘Adam’ is a popular optimisation algorithm for training nn; </a:t>
             </a:r>
             <a:endParaRPr sz="1600">
               <a:solidFill>
@@ -12618,7 +13395,7 @@
             </a:endParaRPr>
           </a:p>
           <a:p>
-            <a:pPr indent="-330200" lvl="0" marL="457200" rtl="0" algn="l">
+            <a:pPr indent="-314960" lvl="0" marL="457200" rtl="0" algn="l">
               <a:spcBef>
                 <a:spcPts val="0"/>
               </a:spcBef>
@@ -12628,7 +13405,7 @@
               <a:buClr>
                 <a:srgbClr val="000000"/>
               </a:buClr>
-              <a:buSzPts val="1600"/>
+              <a:buSzPct val="100000"/>
               <a:buChar char="●"/>
             </a:pPr>
             <a:r>
@@ -12637,7 +13414,7 @@
                   <a:srgbClr val="000000"/>
                 </a:solidFill>
               </a:rPr>
-              <a:t>In this case, the accuracy metric is used, which is the percentage of correct predictions made by the model.</a:t>
+              <a:t>In this case, metric “Recall” is what we will be compared against other model.</a:t>
             </a:r>
             <a:endParaRPr sz="1600">
               <a:solidFill>
@@ -12663,6 +13440,84 @@
                 <a:srgbClr val="000000"/>
               </a:solidFill>
             </a:endParaRPr>
+          </a:p>
+        </p:txBody>
+      </p:sp>
+      <p:pic>
+        <p:nvPicPr>
+          <p:cNvPr id="117" name="Google Shape;117;p20"/>
+          <p:cNvPicPr preferRelativeResize="0"/>
+          <p:nvPr/>
+        </p:nvPicPr>
+        <p:blipFill>
+          <a:blip r:embed="rId3">
+            <a:alphaModFix/>
+          </a:blip>
+          <a:stretch>
+            <a:fillRect/>
+          </a:stretch>
+        </p:blipFill>
+        <p:spPr>
+          <a:xfrm>
+            <a:off x="4792975" y="2002775"/>
+            <a:ext cx="3858550" cy="2548975"/>
+          </a:xfrm>
+          <a:prstGeom prst="rect">
+            <a:avLst/>
+          </a:prstGeom>
+          <a:noFill/>
+          <a:ln>
+            <a:noFill/>
+          </a:ln>
+        </p:spPr>
+      </p:pic>
+      <p:sp>
+        <p:nvSpPr>
+          <p:cNvPr id="118" name="Google Shape;118;p20"/>
+          <p:cNvSpPr txBox="1"/>
+          <p:nvPr/>
+        </p:nvSpPr>
+        <p:spPr>
+          <a:xfrm>
+            <a:off x="7332525" y="121625"/>
+            <a:ext cx="1511100" cy="384900"/>
+          </a:xfrm>
+          <a:prstGeom prst="rect">
+            <a:avLst/>
+          </a:prstGeom>
+          <a:noFill/>
+          <a:ln>
+            <a:noFill/>
+          </a:ln>
+        </p:spPr>
+        <p:txBody>
+          <a:bodyPr anchorCtr="0" anchor="t" bIns="91425" lIns="91425" spcFirstLastPara="1" rIns="91425" wrap="square" tIns="91425">
+            <a:spAutoFit/>
+          </a:bodyPr>
+          <a:lstStyle/>
+          <a:p>
+            <a:pPr indent="0" lvl="0" marL="0" rtl="0" algn="l">
+              <a:spcBef>
+                <a:spcPts val="0"/>
+              </a:spcBef>
+              <a:spcAft>
+                <a:spcPts val="0"/>
+              </a:spcAft>
+              <a:buNone/>
+            </a:pPr>
+            <a:r>
+              <a:rPr b="1" lang="en-GB" sz="1300" u="sng">
+                <a:solidFill>
+                  <a:schemeClr val="lt1"/>
+                </a:solidFill>
+                <a:latin typeface="Roboto"/>
+                <a:ea typeface="Roboto"/>
+                <a:cs typeface="Roboto"/>
+                <a:sym typeface="Roboto"/>
+              </a:rPr>
+              <a:t>Neural Network</a:t>
+            </a:r>
+            <a:endParaRPr b="1" sz="1300" u="sng"/>
           </a:p>
         </p:txBody>
       </p:sp>
@@ -12679,7 +13534,7 @@
   <p:cSld>
     <p:spTree>
       <p:nvGrpSpPr>
-        <p:cNvPr id="115" name="Shape 115"/>
+        <p:cNvPr id="122" name="Shape 122"/>
         <p:cNvGrpSpPr/>
         <p:nvPr/>
       </p:nvGrpSpPr>
@@ -12693,7 +13548,7 @@
       </p:grpSpPr>
       <p:sp>
         <p:nvSpPr>
-          <p:cNvPr id="116" name="Google Shape;116;p21"/>
+          <p:cNvPr id="123" name="Google Shape;123;p21"/>
           <p:cNvSpPr txBox="1"/>
           <p:nvPr>
             <p:ph type="title"/>
@@ -12701,7 +13556,7 @@
         </p:nvSpPr>
         <p:spPr>
           <a:xfrm>
-            <a:off x="471900" y="738725"/>
+            <a:off x="214375" y="781650"/>
             <a:ext cx="8222100" cy="767700"/>
           </a:xfrm>
           <a:prstGeom prst="rect">
@@ -12725,11 +13580,11 @@
             </a:pPr>
             <a:r>
               <a:rPr lang="en-GB"/>
-              <a:t>Compiling</a:t>
+              <a:t>Training</a:t>
             </a:r>
             <a:r>
               <a:rPr lang="en-GB"/>
-              <a:t> the modal </a:t>
+              <a:t> the Model </a:t>
             </a:r>
             <a:endParaRPr/>
           </a:p>
@@ -12737,7 +13592,57 @@
       </p:sp>
       <p:sp>
         <p:nvSpPr>
-          <p:cNvPr id="117" name="Google Shape;117;p21"/>
+          <p:cNvPr id="124" name="Google Shape;124;p21"/>
+          <p:cNvSpPr txBox="1"/>
+          <p:nvPr/>
+        </p:nvSpPr>
+        <p:spPr>
+          <a:xfrm>
+            <a:off x="7332525" y="121625"/>
+            <a:ext cx="1511100" cy="384900"/>
+          </a:xfrm>
+          <a:prstGeom prst="rect">
+            <a:avLst/>
+          </a:prstGeom>
+          <a:noFill/>
+          <a:ln>
+            <a:noFill/>
+          </a:ln>
+        </p:spPr>
+        <p:txBody>
+          <a:bodyPr anchorCtr="0" anchor="t" bIns="91425" lIns="91425" spcFirstLastPara="1" rIns="91425" wrap="square" tIns="91425">
+            <a:spAutoFit/>
+          </a:bodyPr>
+          <a:lstStyle/>
+          <a:p>
+            <a:pPr indent="0" lvl="0" marL="0" rtl="0" algn="l">
+              <a:spcBef>
+                <a:spcPts val="0"/>
+              </a:spcBef>
+              <a:spcAft>
+                <a:spcPts val="0"/>
+              </a:spcAft>
+              <a:buNone/>
+            </a:pPr>
+            <a:r>
+              <a:rPr b="1" lang="en-GB" sz="1300" u="sng">
+                <a:solidFill>
+                  <a:schemeClr val="lt1"/>
+                </a:solidFill>
+                <a:latin typeface="Roboto"/>
+                <a:ea typeface="Roboto"/>
+                <a:cs typeface="Roboto"/>
+                <a:sym typeface="Roboto"/>
+              </a:rPr>
+              <a:t>Neural Network</a:t>
+            </a:r>
+            <a:endParaRPr b="1" sz="1300" u="sng"/>
+          </a:p>
+        </p:txBody>
+      </p:sp>
+      <p:sp>
+        <p:nvSpPr>
+          <p:cNvPr id="125" name="Google Shape;125;p21"/>
           <p:cNvSpPr txBox="1"/>
           <p:nvPr>
             <p:ph idx="1" type="body"/>
@@ -12746,7 +13651,7 @@
         <p:spPr>
           <a:xfrm>
             <a:off x="471900" y="1919075"/>
-            <a:ext cx="8222100" cy="2710200"/>
+            <a:ext cx="3226500" cy="2816700"/>
           </a:xfrm>
           <a:prstGeom prst="rect">
             <a:avLst/>
@@ -12768,17 +13673,49 @@
               <a:buNone/>
             </a:pPr>
             <a:r>
-              <a:rPr lang="en-GB">
+              <a:rPr lang="en-GB" sz="1600">
                 <a:solidFill>
                   <a:srgbClr val="000000"/>
                 </a:solidFill>
               </a:rPr>
-              <a:t>We compile the neural network model using the binary_crossentropy loss function, the Adam optimizer, and the accuracy metric. Then, we use the fit method of the model to train it using 100 epochs and the training data. The fit method returns a history object that contains information about the training process, such as the loss and accuracy for each epoch.</a:t>
-            </a:r>
-            <a:endParaRPr sz="2400"/>
+              <a:t>We train model using scaled training dataset, and tuning with validation dataset.</a:t>
+            </a:r>
+            <a:endParaRPr sz="1200">
+              <a:solidFill>
+                <a:srgbClr val="000000"/>
+              </a:solidFill>
+            </a:endParaRPr>
           </a:p>
         </p:txBody>
       </p:sp>
+      <p:pic>
+        <p:nvPicPr>
+          <p:cNvPr id="126" name="Google Shape;126;p21"/>
+          <p:cNvPicPr preferRelativeResize="0"/>
+          <p:nvPr/>
+        </p:nvPicPr>
+        <p:blipFill>
+          <a:blip r:embed="rId3">
+            <a:alphaModFix/>
+          </a:blip>
+          <a:stretch>
+            <a:fillRect/>
+          </a:stretch>
+        </p:blipFill>
+        <p:spPr>
+          <a:xfrm>
+            <a:off x="4709225" y="2066575"/>
+            <a:ext cx="4134500" cy="2304325"/>
+          </a:xfrm>
+          <a:prstGeom prst="rect">
+            <a:avLst/>
+          </a:prstGeom>
+          <a:noFill/>
+          <a:ln>
+            <a:noFill/>
+          </a:ln>
+        </p:spPr>
+      </p:pic>
     </p:spTree>
   </p:cSld>
   <p:clrMapOvr>
@@ -12788,6 +13725,285 @@
 </file>
 
 <file path=ppt/theme/theme1.xml><?xml version="1.0" encoding="utf-8"?>
+<a:theme xmlns:a="http://schemas.openxmlformats.org/drawingml/2006/main" xmlns:r="http://schemas.openxmlformats.org/officeDocument/2006/relationships">
+  <a:themeElements>
+    <a:clrScheme name="Default">
+      <a:dk1>
+        <a:srgbClr val="000000"/>
+      </a:dk1>
+      <a:lt1>
+        <a:srgbClr val="FFFFFF"/>
+      </a:lt1>
+      <a:dk2>
+        <a:srgbClr val="158158"/>
+      </a:dk2>
+      <a:lt2>
+        <a:srgbClr val="F3F3F3"/>
+      </a:lt2>
+      <a:accent1>
+        <a:srgbClr val="058DC7"/>
+      </a:accent1>
+      <a:accent2>
+        <a:srgbClr val="50B432"/>
+      </a:accent2>
+      <a:accent3>
+        <a:srgbClr val="ED561B"/>
+      </a:accent3>
+      <a:accent4>
+        <a:srgbClr val="EDEF00"/>
+      </a:accent4>
+      <a:accent5>
+        <a:srgbClr val="24CBE5"/>
+      </a:accent5>
+      <a:accent6>
+        <a:srgbClr val="64E572"/>
+      </a:accent6>
+      <a:hlink>
+        <a:srgbClr val="2200CC"/>
+      </a:hlink>
+      <a:folHlink>
+        <a:srgbClr val="551A8B"/>
+      </a:folHlink>
+    </a:clrScheme>
+    <a:fontScheme name="Office">
+      <a:majorFont>
+        <a:latin typeface="Arial"/>
+        <a:ea typeface=""/>
+        <a:cs typeface=""/>
+        <a:font script="Jpan" typeface="ＭＳ Ｐゴシック"/>
+        <a:font script="Hang" typeface="맑은 고딕"/>
+        <a:font script="Hans" typeface="宋体"/>
+        <a:font script="Hant" typeface="新細明體"/>
+        <a:font script="Arab" typeface="Times New Roman"/>
+        <a:font script="Hebr" typeface="Times New Roman"/>
+        <a:font script="Thai" typeface="Angsana New"/>
+        <a:font script="Ethi" typeface="Nyala"/>
+        <a:font script="Beng" typeface="Vrinda"/>
+        <a:font script="Gujr" typeface="Shruti"/>
+        <a:font script="Khmr" typeface="MoolBoran"/>
+        <a:font script="Knda" typeface="Tunga"/>
+        <a:font script="Guru" typeface="Raavi"/>
+        <a:font script="Cans" typeface="Euphemia"/>
+        <a:font script="Cher" typeface="Plantagenet Cherokee"/>
+        <a:font script="Yiii" typeface="Microsoft Yi Baiti"/>
+        <a:font script="Tibt" typeface="Microsoft Himalaya"/>
+        <a:font script="Thaa" typeface="MV Boli"/>
+        <a:font script="Deva" typeface="Mangal"/>
+        <a:font script="Telu" typeface="Gautami"/>
+        <a:font script="Taml" typeface="Latha"/>
+        <a:font script="Syrc" typeface="Estrangelo Edessa"/>
+        <a:font script="Orya" typeface="Kalinga"/>
+        <a:font script="Mlym" typeface="Kartika"/>
+        <a:font script="Laoo" typeface="DokChampa"/>
+        <a:font script="Sinh" typeface="Iskoola Pota"/>
+        <a:font script="Mong" typeface="Mongolian Baiti"/>
+        <a:font script="Viet" typeface="Times New Roman"/>
+        <a:font script="Uigh" typeface="Microsoft Uighur"/>
+        <a:font script="Geor" typeface="Sylfaen"/>
+      </a:majorFont>
+      <a:minorFont>
+        <a:latin typeface="Arial"/>
+        <a:ea typeface=""/>
+        <a:cs typeface=""/>
+        <a:font script="Jpan" typeface="ＭＳ Ｐゴシック"/>
+        <a:font script="Hang" typeface="맑은 고딕"/>
+        <a:font script="Hans" typeface="宋体"/>
+        <a:font script="Hant" typeface="新細明體"/>
+        <a:font script="Arab" typeface="Arial"/>
+        <a:font script="Hebr" typeface="Arial"/>
+        <a:font script="Thai" typeface="Cordia New"/>
+        <a:font script="Ethi" typeface="Nyala"/>
+        <a:font script="Beng" typeface="Vrinda"/>
+        <a:font script="Gujr" typeface="Shruti"/>
+        <a:font script="Khmr" typeface="DaunPenh"/>
+        <a:font script="Knda" typeface="Tunga"/>
+        <a:font script="Guru" typeface="Raavi"/>
+        <a:font script="Cans" typeface="Euphemia"/>
+        <a:font script="Cher" typeface="Plantagenet Cherokee"/>
+        <a:font script="Yiii" typeface="Microsoft Yi Baiti"/>
+        <a:font script="Tibt" typeface="Microsoft Himalaya"/>
+        <a:font script="Thaa" typeface="MV Boli"/>
+        <a:font script="Deva" typeface="Mangal"/>
+        <a:font script="Telu" typeface="Gautami"/>
+        <a:font script="Taml" typeface="Latha"/>
+        <a:font script="Syrc" typeface="Estrangelo Edessa"/>
+        <a:font script="Orya" typeface="Kalinga"/>
+        <a:font script="Mlym" typeface="Kartika"/>
+        <a:font script="Laoo" typeface="DokChampa"/>
+        <a:font script="Sinh" typeface="Iskoola Pota"/>
+        <a:font script="Mong" typeface="Mongolian Baiti"/>
+        <a:font script="Viet" typeface="Arial"/>
+        <a:font script="Uigh" typeface="Microsoft Uighur"/>
+        <a:font script="Geor" typeface="Sylfaen"/>
+      </a:minorFont>
+    </a:fontScheme>
+    <a:fmtScheme name="Office">
+      <a:fillStyleLst>
+        <a:solidFill>
+          <a:schemeClr val="phClr"/>
+        </a:solidFill>
+        <a:gradFill rotWithShape="1">
+          <a:gsLst>
+            <a:gs pos="0">
+              <a:schemeClr val="phClr">
+                <a:tint val="50000"/>
+                <a:satMod val="300000"/>
+              </a:schemeClr>
+            </a:gs>
+            <a:gs pos="35000">
+              <a:schemeClr val="phClr">
+                <a:tint val="37000"/>
+                <a:satMod val="300000"/>
+              </a:schemeClr>
+            </a:gs>
+            <a:gs pos="100000">
+              <a:schemeClr val="phClr">
+                <a:tint val="15000"/>
+                <a:satMod val="350000"/>
+              </a:schemeClr>
+            </a:gs>
+          </a:gsLst>
+          <a:lin ang="16200000" scaled="1"/>
+        </a:gradFill>
+        <a:gradFill rotWithShape="1">
+          <a:gsLst>
+            <a:gs pos="0">
+              <a:schemeClr val="phClr">
+                <a:tint val="100000"/>
+                <a:shade val="100000"/>
+                <a:satMod val="130000"/>
+              </a:schemeClr>
+            </a:gs>
+            <a:gs pos="100000">
+              <a:schemeClr val="phClr">
+                <a:tint val="50000"/>
+                <a:shade val="100000"/>
+                <a:satMod val="350000"/>
+              </a:schemeClr>
+            </a:gs>
+          </a:gsLst>
+          <a:lin ang="16200000" scaled="0"/>
+        </a:gradFill>
+      </a:fillStyleLst>
+      <a:lnStyleLst>
+        <a:ln w="9525" cap="flat" cmpd="sng" algn="ctr">
+          <a:solidFill>
+            <a:schemeClr val="phClr">
+              <a:shade val="95000"/>
+              <a:satMod val="105000"/>
+            </a:schemeClr>
+          </a:solidFill>
+          <a:prstDash val="solid"/>
+        </a:ln>
+        <a:ln w="25400" cap="flat" cmpd="sng" algn="ctr">
+          <a:solidFill>
+            <a:schemeClr val="phClr"/>
+          </a:solidFill>
+          <a:prstDash val="solid"/>
+        </a:ln>
+        <a:ln w="38100" cap="flat" cmpd="sng" algn="ctr">
+          <a:solidFill>
+            <a:schemeClr val="phClr"/>
+          </a:solidFill>
+          <a:prstDash val="solid"/>
+        </a:ln>
+      </a:lnStyleLst>
+      <a:effectStyleLst>
+        <a:effectStyle>
+          <a:effectLst>
+            <a:outerShdw blurRad="40000" dist="20000" dir="5400000" rotWithShape="0">
+              <a:srgbClr val="000000">
+                <a:alpha val="38000"/>
+              </a:srgbClr>
+            </a:outerShdw>
+          </a:effectLst>
+        </a:effectStyle>
+        <a:effectStyle>
+          <a:effectLst>
+            <a:outerShdw blurRad="40000" dist="23000" dir="5400000" rotWithShape="0">
+              <a:srgbClr val="000000">
+                <a:alpha val="35000"/>
+              </a:srgbClr>
+            </a:outerShdw>
+          </a:effectLst>
+        </a:effectStyle>
+        <a:effectStyle>
+          <a:effectLst>
+            <a:outerShdw blurRad="40000" dist="23000" dir="5400000" rotWithShape="0">
+              <a:srgbClr val="000000">
+                <a:alpha val="35000"/>
+              </a:srgbClr>
+            </a:outerShdw>
+          </a:effectLst>
+          <a:scene3d>
+            <a:camera prst="orthographicFront">
+              <a:rot lat="0" lon="0" rev="0"/>
+            </a:camera>
+            <a:lightRig rig="threePt" dir="t">
+              <a:rot lat="0" lon="0" rev="1200000"/>
+            </a:lightRig>
+          </a:scene3d>
+          <a:sp3d>
+            <a:bevelT w="63500" h="25400"/>
+          </a:sp3d>
+        </a:effectStyle>
+      </a:effectStyleLst>
+      <a:bgFillStyleLst>
+        <a:solidFill>
+          <a:schemeClr val="phClr"/>
+        </a:solidFill>
+        <a:gradFill rotWithShape="1">
+          <a:gsLst>
+            <a:gs pos="0">
+              <a:schemeClr val="phClr">
+                <a:tint val="40000"/>
+                <a:satMod val="350000"/>
+              </a:schemeClr>
+            </a:gs>
+            <a:gs pos="40000">
+              <a:schemeClr val="phClr">
+                <a:tint val="45000"/>
+                <a:shade val="99000"/>
+                <a:satMod val="350000"/>
+              </a:schemeClr>
+            </a:gs>
+            <a:gs pos="100000">
+              <a:schemeClr val="phClr">
+                <a:shade val="20000"/>
+                <a:satMod val="255000"/>
+              </a:schemeClr>
+            </a:gs>
+          </a:gsLst>
+          <a:path path="circle">
+            <a:fillToRect l="50000" t="-80000" r="50000" b="180000"/>
+          </a:path>
+        </a:gradFill>
+        <a:gradFill rotWithShape="1">
+          <a:gsLst>
+            <a:gs pos="0">
+              <a:schemeClr val="phClr">
+                <a:tint val="80000"/>
+                <a:satMod val="300000"/>
+              </a:schemeClr>
+            </a:gs>
+            <a:gs pos="100000">
+              <a:schemeClr val="phClr">
+                <a:shade val="30000"/>
+                <a:satMod val="200000"/>
+              </a:schemeClr>
+            </a:gs>
+          </a:gsLst>
+          <a:path path="circle">
+            <a:fillToRect l="50000" t="50000" r="50000" b="50000"/>
+          </a:path>
+        </a:gradFill>
+      </a:bgFillStyleLst>
+    </a:fmtScheme>
+  </a:themeElements>
+</a:theme>
+</file>
+
+<file path=ppt/theme/theme2.xml><?xml version="1.0" encoding="utf-8"?>
 <a:theme xmlns:a="http://schemas.openxmlformats.org/drawingml/2006/main" xmlns:r="http://schemas.openxmlformats.org/officeDocument/2006/relationships" name="Material">
   <a:themeElements>
     <a:clrScheme name="Material">
@@ -13064,283 +14280,4 @@
     </a:fmtScheme>
   </a:themeElements>
 </a:theme>
-</file>
-
-<file path=ppt/theme/theme2.xml><?xml version="1.0" encoding="utf-8"?>
-<a:theme xmlns:a="http://schemas.openxmlformats.org/drawingml/2006/main" xmlns:r="http://schemas.openxmlformats.org/officeDocument/2006/relationships">
-  <a:themeElements>
-    <a:clrScheme name="Default">
-      <a:dk1>
-        <a:srgbClr val="000000"/>
-      </a:dk1>
-      <a:lt1>
-        <a:srgbClr val="FFFFFF"/>
-      </a:lt1>
-      <a:dk2>
-        <a:srgbClr val="158158"/>
-      </a:dk2>
-      <a:lt2>
-        <a:srgbClr val="F3F3F3"/>
-      </a:lt2>
-      <a:accent1>
-        <a:srgbClr val="058DC7"/>
-      </a:accent1>
-      <a:accent2>
-        <a:srgbClr val="50B432"/>
-      </a:accent2>
-      <a:accent3>
-        <a:srgbClr val="ED561B"/>
-      </a:accent3>
-      <a:accent4>
-        <a:srgbClr val="EDEF00"/>
-      </a:accent4>
-      <a:accent5>
-        <a:srgbClr val="24CBE5"/>
-      </a:accent5>
-      <a:accent6>
-        <a:srgbClr val="64E572"/>
-      </a:accent6>
-      <a:hlink>
-        <a:srgbClr val="2200CC"/>
-      </a:hlink>
-      <a:folHlink>
-        <a:srgbClr val="551A8B"/>
-      </a:folHlink>
-    </a:clrScheme>
-    <a:fontScheme name="Office">
-      <a:majorFont>
-        <a:latin typeface="Arial"/>
-        <a:ea typeface=""/>
-        <a:cs typeface=""/>
-        <a:font script="Jpan" typeface="ＭＳ Ｐゴシック"/>
-        <a:font script="Hang" typeface="맑은 고딕"/>
-        <a:font script="Hans" typeface="宋体"/>
-        <a:font script="Hant" typeface="新細明體"/>
-        <a:font script="Arab" typeface="Times New Roman"/>
-        <a:font script="Hebr" typeface="Times New Roman"/>
-        <a:font script="Thai" typeface="Angsana New"/>
-        <a:font script="Ethi" typeface="Nyala"/>
-        <a:font script="Beng" typeface="Vrinda"/>
-        <a:font script="Gujr" typeface="Shruti"/>
-        <a:font script="Khmr" typeface="MoolBoran"/>
-        <a:font script="Knda" typeface="Tunga"/>
-        <a:font script="Guru" typeface="Raavi"/>
-        <a:font script="Cans" typeface="Euphemia"/>
-        <a:font script="Cher" typeface="Plantagenet Cherokee"/>
-        <a:font script="Yiii" typeface="Microsoft Yi Baiti"/>
-        <a:font script="Tibt" typeface="Microsoft Himalaya"/>
-        <a:font script="Thaa" typeface="MV Boli"/>
-        <a:font script="Deva" typeface="Mangal"/>
-        <a:font script="Telu" typeface="Gautami"/>
-        <a:font script="Taml" typeface="Latha"/>
-        <a:font script="Syrc" typeface="Estrangelo Edessa"/>
-        <a:font script="Orya" typeface="Kalinga"/>
-        <a:font script="Mlym" typeface="Kartika"/>
-        <a:font script="Laoo" typeface="DokChampa"/>
-        <a:font script="Sinh" typeface="Iskoola Pota"/>
-        <a:font script="Mong" typeface="Mongolian Baiti"/>
-        <a:font script="Viet" typeface="Times New Roman"/>
-        <a:font script="Uigh" typeface="Microsoft Uighur"/>
-        <a:font script="Geor" typeface="Sylfaen"/>
-      </a:majorFont>
-      <a:minorFont>
-        <a:latin typeface="Arial"/>
-        <a:ea typeface=""/>
-        <a:cs typeface=""/>
-        <a:font script="Jpan" typeface="ＭＳ Ｐゴシック"/>
-        <a:font script="Hang" typeface="맑은 고딕"/>
-        <a:font script="Hans" typeface="宋体"/>
-        <a:font script="Hant" typeface="新細明體"/>
-        <a:font script="Arab" typeface="Arial"/>
-        <a:font script="Hebr" typeface="Arial"/>
-        <a:font script="Thai" typeface="Cordia New"/>
-        <a:font script="Ethi" typeface="Nyala"/>
-        <a:font script="Beng" typeface="Vrinda"/>
-        <a:font script="Gujr" typeface="Shruti"/>
-        <a:font script="Khmr" typeface="DaunPenh"/>
-        <a:font script="Knda" typeface="Tunga"/>
-        <a:font script="Guru" typeface="Raavi"/>
-        <a:font script="Cans" typeface="Euphemia"/>
-        <a:font script="Cher" typeface="Plantagenet Cherokee"/>
-        <a:font script="Yiii" typeface="Microsoft Yi Baiti"/>
-        <a:font script="Tibt" typeface="Microsoft Himalaya"/>
-        <a:font script="Thaa" typeface="MV Boli"/>
-        <a:font script="Deva" typeface="Mangal"/>
-        <a:font script="Telu" typeface="Gautami"/>
-        <a:font script="Taml" typeface="Latha"/>
-        <a:font script="Syrc" typeface="Estrangelo Edessa"/>
-        <a:font script="Orya" typeface="Kalinga"/>
-        <a:font script="Mlym" typeface="Kartika"/>
-        <a:font script="Laoo" typeface="DokChampa"/>
-        <a:font script="Sinh" typeface="Iskoola Pota"/>
-        <a:font script="Mong" typeface="Mongolian Baiti"/>
-        <a:font script="Viet" typeface="Arial"/>
-        <a:font script="Uigh" typeface="Microsoft Uighur"/>
-        <a:font script="Geor" typeface="Sylfaen"/>
-      </a:minorFont>
-    </a:fontScheme>
-    <a:fmtScheme name="Office">
-      <a:fillStyleLst>
-        <a:solidFill>
-          <a:schemeClr val="phClr"/>
-        </a:solidFill>
-        <a:gradFill rotWithShape="1">
-          <a:gsLst>
-            <a:gs pos="0">
-              <a:schemeClr val="phClr">
-                <a:tint val="50000"/>
-                <a:satMod val="300000"/>
-              </a:schemeClr>
-            </a:gs>
-            <a:gs pos="35000">
-              <a:schemeClr val="phClr">
-                <a:tint val="37000"/>
-                <a:satMod val="300000"/>
-              </a:schemeClr>
-            </a:gs>
-            <a:gs pos="100000">
-              <a:schemeClr val="phClr">
-                <a:tint val="15000"/>
-                <a:satMod val="350000"/>
-              </a:schemeClr>
-            </a:gs>
-          </a:gsLst>
-          <a:lin ang="16200000" scaled="1"/>
-        </a:gradFill>
-        <a:gradFill rotWithShape="1">
-          <a:gsLst>
-            <a:gs pos="0">
-              <a:schemeClr val="phClr">
-                <a:tint val="100000"/>
-                <a:shade val="100000"/>
-                <a:satMod val="130000"/>
-              </a:schemeClr>
-            </a:gs>
-            <a:gs pos="100000">
-              <a:schemeClr val="phClr">
-                <a:tint val="50000"/>
-                <a:shade val="100000"/>
-                <a:satMod val="350000"/>
-              </a:schemeClr>
-            </a:gs>
-          </a:gsLst>
-          <a:lin ang="16200000" scaled="0"/>
-        </a:gradFill>
-      </a:fillStyleLst>
-      <a:lnStyleLst>
-        <a:ln w="9525" cap="flat" cmpd="sng" algn="ctr">
-          <a:solidFill>
-            <a:schemeClr val="phClr">
-              <a:shade val="95000"/>
-              <a:satMod val="105000"/>
-            </a:schemeClr>
-          </a:solidFill>
-          <a:prstDash val="solid"/>
-        </a:ln>
-        <a:ln w="25400" cap="flat" cmpd="sng" algn="ctr">
-          <a:solidFill>
-            <a:schemeClr val="phClr"/>
-          </a:solidFill>
-          <a:prstDash val="solid"/>
-        </a:ln>
-        <a:ln w="38100" cap="flat" cmpd="sng" algn="ctr">
-          <a:solidFill>
-            <a:schemeClr val="phClr"/>
-          </a:solidFill>
-          <a:prstDash val="solid"/>
-        </a:ln>
-      </a:lnStyleLst>
-      <a:effectStyleLst>
-        <a:effectStyle>
-          <a:effectLst>
-            <a:outerShdw blurRad="40000" dist="20000" dir="5400000" rotWithShape="0">
-              <a:srgbClr val="000000">
-                <a:alpha val="38000"/>
-              </a:srgbClr>
-            </a:outerShdw>
-          </a:effectLst>
-        </a:effectStyle>
-        <a:effectStyle>
-          <a:effectLst>
-            <a:outerShdw blurRad="40000" dist="23000" dir="5400000" rotWithShape="0">
-              <a:srgbClr val="000000">
-                <a:alpha val="35000"/>
-              </a:srgbClr>
-            </a:outerShdw>
-          </a:effectLst>
-        </a:effectStyle>
-        <a:effectStyle>
-          <a:effectLst>
-            <a:outerShdw blurRad="40000" dist="23000" dir="5400000" rotWithShape="0">
-              <a:srgbClr val="000000">
-                <a:alpha val="35000"/>
-              </a:srgbClr>
-            </a:outerShdw>
-          </a:effectLst>
-          <a:scene3d>
-            <a:camera prst="orthographicFront">
-              <a:rot lat="0" lon="0" rev="0"/>
-            </a:camera>
-            <a:lightRig rig="threePt" dir="t">
-              <a:rot lat="0" lon="0" rev="1200000"/>
-            </a:lightRig>
-          </a:scene3d>
-          <a:sp3d>
-            <a:bevelT w="63500" h="25400"/>
-          </a:sp3d>
-        </a:effectStyle>
-      </a:effectStyleLst>
-      <a:bgFillStyleLst>
-        <a:solidFill>
-          <a:schemeClr val="phClr"/>
-        </a:solidFill>
-        <a:gradFill rotWithShape="1">
-          <a:gsLst>
-            <a:gs pos="0">
-              <a:schemeClr val="phClr">
-                <a:tint val="40000"/>
-                <a:satMod val="350000"/>
-              </a:schemeClr>
-            </a:gs>
-            <a:gs pos="40000">
-              <a:schemeClr val="phClr">
-                <a:tint val="45000"/>
-                <a:shade val="99000"/>
-                <a:satMod val="350000"/>
-              </a:schemeClr>
-            </a:gs>
-            <a:gs pos="100000">
-              <a:schemeClr val="phClr">
-                <a:shade val="20000"/>
-                <a:satMod val="255000"/>
-              </a:schemeClr>
-            </a:gs>
-          </a:gsLst>
-          <a:path path="circle">
-            <a:fillToRect l="50000" t="-80000" r="50000" b="180000"/>
-          </a:path>
-        </a:gradFill>
-        <a:gradFill rotWithShape="1">
-          <a:gsLst>
-            <a:gs pos="0">
-              <a:schemeClr val="phClr">
-                <a:tint val="80000"/>
-                <a:satMod val="300000"/>
-              </a:schemeClr>
-            </a:gs>
-            <a:gs pos="100000">
-              <a:schemeClr val="phClr">
-                <a:shade val="30000"/>
-                <a:satMod val="200000"/>
-              </a:schemeClr>
-            </a:gs>
-          </a:gsLst>
-          <a:path path="circle">
-            <a:fillToRect l="50000" t="50000" r="50000" b="50000"/>
-          </a:path>
-        </a:gradFill>
-      </a:bgFillStyleLst>
-    </a:fmtScheme>
-  </a:themeElements>
-</a:theme>
 </file>
</xml_diff>